<commit_message>
Updated Slides : Added Result
</commit_message>
<xml_diff>
--- a/534-Slides.pptx
+++ b/534-Slides.pptx
@@ -262,7 +262,7 @@
           <a:p>
             <a:fld id="{6A4B53A7-3209-46A6-9454-F38EAC8F11E7}" type="datetimeFigureOut">
               <a:rPr lang="en-US" smtClean="0"/>
-              <a:t>1/24/24</a:t>
+              <a:t>1/25/24</a:t>
             </a:fld>
             <a:endParaRPr lang="en-US"/>
           </a:p>
@@ -513,7 +513,7 @@
           <a:p>
             <a:fld id="{6A4B53A7-3209-46A6-9454-F38EAC8F11E7}" type="datetimeFigureOut">
               <a:rPr lang="en-US" smtClean="0"/>
-              <a:t>1/24/24</a:t>
+              <a:t>1/25/24</a:t>
             </a:fld>
             <a:endParaRPr lang="en-US"/>
           </a:p>
@@ -774,7 +774,7 @@
           <a:p>
             <a:fld id="{6A4B53A7-3209-46A6-9454-F38EAC8F11E7}" type="datetimeFigureOut">
               <a:rPr lang="en-US" smtClean="0"/>
-              <a:t>1/24/24</a:t>
+              <a:t>1/25/24</a:t>
             </a:fld>
             <a:endParaRPr lang="en-US"/>
           </a:p>
@@ -1025,7 +1025,7 @@
           <a:p>
             <a:fld id="{6A4B53A7-3209-46A6-9454-F38EAC8F11E7}" type="datetimeFigureOut">
               <a:rPr lang="en-US" smtClean="0"/>
-              <a:t>1/24/24</a:t>
+              <a:t>1/25/24</a:t>
             </a:fld>
             <a:endParaRPr lang="en-US"/>
           </a:p>
@@ -1353,7 +1353,7 @@
           <a:p>
             <a:fld id="{6A4B53A7-3209-46A6-9454-F38EAC8F11E7}" type="datetimeFigureOut">
               <a:rPr lang="en-US" smtClean="0"/>
-              <a:t>1/24/24</a:t>
+              <a:t>1/25/24</a:t>
             </a:fld>
             <a:endParaRPr lang="en-US"/>
           </a:p>
@@ -1671,7 +1671,7 @@
           <a:p>
             <a:fld id="{6A4B53A7-3209-46A6-9454-F38EAC8F11E7}" type="datetimeFigureOut">
               <a:rPr lang="en-US" smtClean="0"/>
-              <a:t>1/24/24</a:t>
+              <a:t>1/25/24</a:t>
             </a:fld>
             <a:endParaRPr lang="en-US"/>
           </a:p>
@@ -2136,7 +2136,7 @@
           <a:p>
             <a:fld id="{6A4B53A7-3209-46A6-9454-F38EAC8F11E7}" type="datetimeFigureOut">
               <a:rPr lang="en-US" smtClean="0"/>
-              <a:t>1/24/24</a:t>
+              <a:t>1/25/24</a:t>
             </a:fld>
             <a:endParaRPr lang="en-US"/>
           </a:p>
@@ -2330,7 +2330,7 @@
           <a:p>
             <a:fld id="{6A4B53A7-3209-46A6-9454-F38EAC8F11E7}" type="datetimeFigureOut">
               <a:rPr lang="en-US" smtClean="0"/>
-              <a:t>1/24/24</a:t>
+              <a:t>1/25/24</a:t>
             </a:fld>
             <a:endParaRPr lang="en-US"/>
           </a:p>
@@ -2496,7 +2496,7 @@
           <a:p>
             <a:fld id="{6A4B53A7-3209-46A6-9454-F38EAC8F11E7}" type="datetimeFigureOut">
               <a:rPr lang="en-US" smtClean="0"/>
-              <a:t>1/24/24</a:t>
+              <a:t>1/25/24</a:t>
             </a:fld>
             <a:endParaRPr lang="en-US"/>
           </a:p>
@@ -2860,7 +2860,7 @@
           <a:p>
             <a:fld id="{6A4B53A7-3209-46A6-9454-F38EAC8F11E7}" type="datetimeFigureOut">
               <a:rPr lang="en-US" smtClean="0"/>
-              <a:t>1/24/24</a:t>
+              <a:t>1/25/24</a:t>
             </a:fld>
             <a:endParaRPr lang="en-US"/>
           </a:p>
@@ -3204,7 +3204,7 @@
           <a:p>
             <a:fld id="{6A4B53A7-3209-46A6-9454-F38EAC8F11E7}" type="datetimeFigureOut">
               <a:rPr lang="en-US" smtClean="0"/>
-              <a:t>1/24/24</a:t>
+              <a:t>1/25/24</a:t>
             </a:fld>
             <a:endParaRPr lang="en-US"/>
           </a:p>
@@ -3499,7 +3499,7 @@
             <a:fld id="{6A4B53A7-3209-46A6-9454-F38EAC8F11E7}" type="datetimeFigureOut">
               <a:rPr lang="en-US" smtClean="0"/>
               <a:pPr/>
-              <a:t>1/24/24</a:t>
+              <a:t>1/25/24</a:t>
             </a:fld>
             <a:endParaRPr lang="en-US" dirty="0"/>
           </a:p>
@@ -7859,21 +7859,21 @@
           <a:chExt cx="0" cy="0"/>
         </a:xfrm>
       </p:grpSpPr>
-      <p:cxnSp>
-        <p:nvCxnSpPr>
-          <p:cNvPr id="21" name="Straight Connector 7">
-            <a:extLst>
-              <a:ext uri="{FF2B5EF4-FFF2-40B4-BE49-F238E27FC236}">
-                <a16:creationId xmlns:a16="http://schemas.microsoft.com/office/drawing/2014/main" id="{D1B787A8-0D67-4B7E-9B48-86BD906AB6B5}"/>
+      <p:sp useBgFill="1">
+        <p:nvSpPr>
+          <p:cNvPr id="33" name="Rectangle 32">
+            <a:extLst>
+              <a:ext uri="{FF2B5EF4-FFF2-40B4-BE49-F238E27FC236}">
+                <a16:creationId xmlns:a16="http://schemas.microsoft.com/office/drawing/2014/main" id="{A2679492-7988-4050-9056-542444452411}"/>
               </a:ext>
               <a:ext uri="{C183D7F6-B498-43B3-948B-1728B52AA6E4}">
                 <adec:decorative xmlns:adec="http://schemas.microsoft.com/office/drawing/2017/decorative" val="1"/>
               </a:ext>
             </a:extLst>
           </p:cNvPr>
-          <p:cNvCxnSpPr>
-            <a:cxnSpLocks noGrp="1" noRot="1" noChangeAspect="1" noMove="1" noResize="1" noEditPoints="1" noAdjustHandles="1" noChangeArrowheads="1" noChangeShapeType="1"/>
-          </p:cNvCxnSpPr>
+          <p:cNvSpPr>
+            <a:spLocks noGrp="1" noRot="1" noChangeAspect="1" noMove="1" noResize="1" noEditPoints="1" noAdjustHandles="1" noChangeArrowheads="1" noChangeShapeType="1" noTextEdit="1"/>
+          </p:cNvSpPr>
           <p:nvPr>
             <p:extLst>
               <p:ext uri="{386F3935-93C4-4BCD-93E2-E3B085C9AB24}">
@@ -7881,52 +7881,92 @@
               </p:ext>
             </p:extLst>
           </p:nvPr>
-        </p:nvCxnSpPr>
+        </p:nvSpPr>
         <p:spPr>
           <a:xfrm>
-            <a:off x="715890" y="1114050"/>
-            <a:ext cx="0" cy="5735637"/>
+            <a:off x="0" y="0"/>
+            <a:ext cx="12192000" cy="6858000"/>
           </a:xfrm>
-          <a:prstGeom prst="line">
+          <a:prstGeom prst="rect">
             <a:avLst/>
           </a:prstGeom>
-          <a:ln w="25400" cap="sq">
-            <a:gradFill flip="none" rotWithShape="1">
-              <a:gsLst>
-                <a:gs pos="0">
-                  <a:schemeClr val="accent2"/>
-                </a:gs>
-                <a:gs pos="100000">
-                  <a:schemeClr val="accent4"/>
-                </a:gs>
-              </a:gsLst>
-              <a:lin ang="16200000" scaled="1"/>
-              <a:tileRect/>
-            </a:gradFill>
-            <a:bevel/>
+          <a:ln>
+            <a:noFill/>
           </a:ln>
         </p:spPr>
         <p:style>
-          <a:lnRef idx="1">
-            <a:schemeClr val="accent1"/>
+          <a:lnRef idx="2">
+            <a:schemeClr val="accent1">
+              <a:shade val="50000"/>
+            </a:schemeClr>
           </a:lnRef>
-          <a:fillRef idx="0">
+          <a:fillRef idx="1">
             <a:schemeClr val="accent1"/>
           </a:fillRef>
           <a:effectRef idx="0">
             <a:schemeClr val="accent1"/>
           </a:effectRef>
           <a:fontRef idx="minor">
-            <a:schemeClr val="tx1"/>
+            <a:schemeClr val="lt1"/>
           </a:fontRef>
         </p:style>
-      </p:cxnSp>
-      <p:sp>
-        <p:nvSpPr>
-          <p:cNvPr id="23" name="Rectangle 9">
-            <a:extLst>
-              <a:ext uri="{FF2B5EF4-FFF2-40B4-BE49-F238E27FC236}">
-                <a16:creationId xmlns:a16="http://schemas.microsoft.com/office/drawing/2014/main" id="{8F9CBE3F-79A8-4F8F-88D9-DAD03D0D281F}"/>
+        <p:txBody>
+          <a:bodyPr rtlCol="0" anchor="ctr"/>
+          <a:lstStyle/>
+          <a:p>
+            <a:pPr algn="ctr"/>
+            <a:endParaRPr lang="en-US"/>
+          </a:p>
+        </p:txBody>
+      </p:sp>
+      <p:sp>
+        <p:nvSpPr>
+          <p:cNvPr id="2" name="Title 1">
+            <a:extLst>
+              <a:ext uri="{FF2B5EF4-FFF2-40B4-BE49-F238E27FC236}">
+                <a16:creationId xmlns:a16="http://schemas.microsoft.com/office/drawing/2014/main" id="{B3D47821-778B-38AE-C530-4919AD696690}"/>
+              </a:ext>
+            </a:extLst>
+          </p:cNvPr>
+          <p:cNvSpPr>
+            <a:spLocks noGrp="1"/>
+          </p:cNvSpPr>
+          <p:nvPr>
+            <p:ph type="title"/>
+          </p:nvPr>
+        </p:nvSpPr>
+        <p:spPr>
+          <a:xfrm>
+            <a:off x="6412091" y="501651"/>
+            <a:ext cx="4395340" cy="1716255"/>
+          </a:xfrm>
+        </p:spPr>
+        <p:txBody>
+          <a:bodyPr vert="horz" lIns="91440" tIns="45720" rIns="91440" bIns="45720" rtlCol="0" anchor="b">
+            <a:normAutofit/>
+          </a:bodyPr>
+          <a:lstStyle/>
+          <a:p>
+            <a:r>
+              <a:rPr lang="en-US" sz="5400" b="1" i="0" kern="1200" cap="all" baseline="0">
+                <a:solidFill>
+                  <a:schemeClr val="tx1"/>
+                </a:solidFill>
+                <a:latin typeface="+mj-lt"/>
+                <a:ea typeface="+mj-ea"/>
+                <a:cs typeface="+mj-cs"/>
+              </a:rPr>
+              <a:t>Results</a:t>
+            </a:r>
+          </a:p>
+        </p:txBody>
+      </p:sp>
+      <p:sp>
+        <p:nvSpPr>
+          <p:cNvPr id="35" name="Rectangle 34">
+            <a:extLst>
+              <a:ext uri="{FF2B5EF4-FFF2-40B4-BE49-F238E27FC236}">
+                <a16:creationId xmlns:a16="http://schemas.microsoft.com/office/drawing/2014/main" id="{B091B163-7D61-4891-ABCF-5C13D9C418D0}"/>
               </a:ext>
               <a:ext uri="{C183D7F6-B498-43B3-948B-1728B52AA6E4}">
                 <adec:decorative xmlns:adec="http://schemas.microsoft.com/office/drawing/2017/decorative" val="1"/>
@@ -7947,7 +7987,7 @@
         <p:spPr>
           <a:xfrm>
             <a:off x="0" y="0"/>
-            <a:ext cx="12192000" cy="6858000"/>
+            <a:ext cx="5779911" cy="6858000"/>
           </a:xfrm>
           <a:prstGeom prst="rect">
             <a:avLst/>
@@ -7995,62 +8035,109 @@
       </p:sp>
       <p:sp>
         <p:nvSpPr>
-          <p:cNvPr id="2" name="Title 1">
-            <a:extLst>
-              <a:ext uri="{FF2B5EF4-FFF2-40B4-BE49-F238E27FC236}">
-                <a16:creationId xmlns:a16="http://schemas.microsoft.com/office/drawing/2014/main" id="{B3D47821-778B-38AE-C530-4919AD696690}"/>
-              </a:ext>
-            </a:extLst>
-          </p:cNvPr>
-          <p:cNvSpPr>
-            <a:spLocks noGrp="1"/>
-          </p:cNvSpPr>
-          <p:nvPr>
-            <p:ph type="title"/>
-          </p:nvPr>
+          <p:cNvPr id="3" name="TextBox 2">
+            <a:extLst>
+              <a:ext uri="{FF2B5EF4-FFF2-40B4-BE49-F238E27FC236}">
+                <a16:creationId xmlns:a16="http://schemas.microsoft.com/office/drawing/2014/main" id="{3CC661B7-822A-7159-BC45-736BCC87E55F}"/>
+              </a:ext>
+            </a:extLst>
+          </p:cNvPr>
+          <p:cNvSpPr txBox="1"/>
+          <p:nvPr/>
         </p:nvSpPr>
         <p:spPr>
           <a:xfrm>
-            <a:off x="1467717" y="40231"/>
-            <a:ext cx="9120771" cy="992438"/>
+            <a:off x="6392583" y="2645922"/>
+            <a:ext cx="4434721" cy="3710427"/>
           </a:xfrm>
+          <a:prstGeom prst="rect">
+            <a:avLst/>
+          </a:prstGeom>
         </p:spPr>
         <p:txBody>
-          <a:bodyPr vert="horz" lIns="91440" tIns="45720" rIns="91440" bIns="45720" rtlCol="0" anchor="b">
+          <a:bodyPr vert="horz" lIns="91440" tIns="45720" rIns="91440" bIns="45720" rtlCol="0" anchor="t">
             <a:normAutofit/>
           </a:bodyPr>
           <a:lstStyle/>
           <a:p>
-            <a:pPr algn="ctr"/>
-            <a:r>
-              <a:rPr lang="en-US" sz="6000" b="1" i="0" kern="1200" cap="all" baseline="0" dirty="0">
-                <a:solidFill>
-                  <a:schemeClr val="bg1"/>
-                </a:solidFill>
-                <a:latin typeface="+mj-lt"/>
-                <a:ea typeface="+mj-ea"/>
-                <a:cs typeface="+mj-cs"/>
-              </a:rPr>
-              <a:t>Results</a:t>
-            </a:r>
-          </a:p>
-        </p:txBody>
-      </p:sp>
-      <p:sp>
-        <p:nvSpPr>
-          <p:cNvPr id="25" name="Graphic 22">
-            <a:extLst>
-              <a:ext uri="{FF2B5EF4-FFF2-40B4-BE49-F238E27FC236}">
-                <a16:creationId xmlns:a16="http://schemas.microsoft.com/office/drawing/2014/main" id="{508BEF50-7B1E-49A4-BC19-5F4F1D755E64}"/>
+            <a:pPr defTabSz="914400">
+              <a:lnSpc>
+                <a:spcPct val="90000"/>
+              </a:lnSpc>
+              <a:spcAft>
+                <a:spcPts val="600"/>
+              </a:spcAft>
+            </a:pPr>
+            <a:r>
+              <a:rPr lang="en-US" dirty="0"/>
+              <a:t>The wrapper package will allow the user to:</a:t>
+            </a:r>
+          </a:p>
+          <a:p>
+            <a:pPr marL="342900" indent="-228600" defTabSz="914400">
+              <a:lnSpc>
+                <a:spcPct val="90000"/>
+              </a:lnSpc>
+              <a:spcAft>
+                <a:spcPts val="600"/>
+              </a:spcAft>
+              <a:buFont typeface="Arial" panose="020B0604020202020204" pitchFamily="34" charset="0"/>
+              <a:buChar char="•"/>
+            </a:pPr>
+            <a:r>
+              <a:rPr lang="en-US" dirty="0"/>
+              <a:t>View the show/season data retrieved from the API as a DataFrame.</a:t>
+            </a:r>
+          </a:p>
+          <a:p>
+            <a:pPr marL="342900" indent="-228600" defTabSz="914400">
+              <a:lnSpc>
+                <a:spcPct val="90000"/>
+              </a:lnSpc>
+              <a:spcAft>
+                <a:spcPts val="600"/>
+              </a:spcAft>
+              <a:buFont typeface="Arial" panose="020B0604020202020204" pitchFamily="34" charset="0"/>
+              <a:buChar char="•"/>
+            </a:pPr>
+            <a:r>
+              <a:rPr lang="en-US" dirty="0"/>
+              <a:t>View a plot between ‘Ratings’ and ‘Episode Number’ for any given season.</a:t>
+            </a:r>
+          </a:p>
+          <a:p>
+            <a:pPr marL="342900" indent="-228600" defTabSz="914400">
+              <a:lnSpc>
+                <a:spcPct val="90000"/>
+              </a:lnSpc>
+              <a:spcAft>
+                <a:spcPts val="600"/>
+              </a:spcAft>
+              <a:buFont typeface="Arial" panose="020B0604020202020204" pitchFamily="34" charset="0"/>
+              <a:buChar char="•"/>
+            </a:pPr>
+            <a:r>
+              <a:rPr lang="en-US" dirty="0"/>
+              <a:t>View the average rating for all the episodes from a given season</a:t>
+            </a:r>
+          </a:p>
+        </p:txBody>
+      </p:sp>
+      <p:cxnSp>
+        <p:nvCxnSpPr>
+          <p:cNvPr id="37" name="Straight Connector 36">
+            <a:extLst>
+              <a:ext uri="{FF2B5EF4-FFF2-40B4-BE49-F238E27FC236}">
+                <a16:creationId xmlns:a16="http://schemas.microsoft.com/office/drawing/2014/main" id="{C49DA8F6-BCC1-4447-B54C-57856834B94B}"/>
               </a:ext>
               <a:ext uri="{C183D7F6-B498-43B3-948B-1728B52AA6E4}">
                 <adec:decorative xmlns:adec="http://schemas.microsoft.com/office/drawing/2017/decorative" val="1"/>
               </a:ext>
             </a:extLst>
           </p:cNvPr>
-          <p:cNvSpPr>
-            <a:spLocks noGrp="1" noRot="1" noChangeAspect="1" noMove="1" noResize="1" noEditPoints="1" noAdjustHandles="1" noChangeArrowheads="1" noChangeShapeType="1" noTextEdit="1"/>
-          </p:cNvSpPr>
+          <p:cNvCxnSpPr>
+            <a:cxnSpLocks noGrp="1" noRot="1" noChangeAspect="1" noMove="1" noResize="1" noEditPoints="1" noAdjustHandles="1" noChangeArrowheads="1" noChangeShapeType="1"/>
+          </p:cNvCxnSpPr>
           <p:nvPr>
             <p:extLst>
               <p:ext uri="{386F3935-93C4-4BCD-93E2-E3B085C9AB24}">
@@ -8058,965 +8145,28 @@
               </p:ext>
             </p:extLst>
           </p:nvPr>
-        </p:nvSpPr>
-        <p:spPr>
-          <a:xfrm>
-            <a:off x="1261869" y="2383077"/>
-            <a:ext cx="151536" cy="151536"/>
-          </a:xfrm>
-          <a:custGeom>
-            <a:avLst/>
-            <a:gdLst>
-              <a:gd name="connsiteX0" fmla="*/ 141251 w 151536"/>
-              <a:gd name="connsiteY0" fmla="*/ 65483 h 151536"/>
-              <a:gd name="connsiteX1" fmla="*/ 86053 w 151536"/>
-              <a:gd name="connsiteY1" fmla="*/ 65483 h 151536"/>
-              <a:gd name="connsiteX2" fmla="*/ 86053 w 151536"/>
-              <a:gd name="connsiteY2" fmla="*/ 10285 h 151536"/>
-              <a:gd name="connsiteX3" fmla="*/ 75768 w 151536"/>
-              <a:gd name="connsiteY3" fmla="*/ 0 h 151536"/>
-              <a:gd name="connsiteX4" fmla="*/ 65483 w 151536"/>
-              <a:gd name="connsiteY4" fmla="*/ 10285 h 151536"/>
-              <a:gd name="connsiteX5" fmla="*/ 65483 w 151536"/>
-              <a:gd name="connsiteY5" fmla="*/ 65483 h 151536"/>
-              <a:gd name="connsiteX6" fmla="*/ 10285 w 151536"/>
-              <a:gd name="connsiteY6" fmla="*/ 65483 h 151536"/>
-              <a:gd name="connsiteX7" fmla="*/ 0 w 151536"/>
-              <a:gd name="connsiteY7" fmla="*/ 75768 h 151536"/>
-              <a:gd name="connsiteX8" fmla="*/ 10285 w 151536"/>
-              <a:gd name="connsiteY8" fmla="*/ 86053 h 151536"/>
-              <a:gd name="connsiteX9" fmla="*/ 65483 w 151536"/>
-              <a:gd name="connsiteY9" fmla="*/ 86053 h 151536"/>
-              <a:gd name="connsiteX10" fmla="*/ 65483 w 151536"/>
-              <a:gd name="connsiteY10" fmla="*/ 141251 h 151536"/>
-              <a:gd name="connsiteX11" fmla="*/ 75768 w 151536"/>
-              <a:gd name="connsiteY11" fmla="*/ 151536 h 151536"/>
-              <a:gd name="connsiteX12" fmla="*/ 86053 w 151536"/>
-              <a:gd name="connsiteY12" fmla="*/ 141251 h 151536"/>
-              <a:gd name="connsiteX13" fmla="*/ 86053 w 151536"/>
-              <a:gd name="connsiteY13" fmla="*/ 86053 h 151536"/>
-              <a:gd name="connsiteX14" fmla="*/ 141251 w 151536"/>
-              <a:gd name="connsiteY14" fmla="*/ 86053 h 151536"/>
-              <a:gd name="connsiteX15" fmla="*/ 151536 w 151536"/>
-              <a:gd name="connsiteY15" fmla="*/ 75768 h 151536"/>
-              <a:gd name="connsiteX16" fmla="*/ 141251 w 151536"/>
-              <a:gd name="connsiteY16" fmla="*/ 65483 h 151536"/>
-            </a:gdLst>
-            <a:ahLst/>
-            <a:cxnLst>
-              <a:cxn ang="0">
-                <a:pos x="connsiteX0" y="connsiteY0"/>
-              </a:cxn>
-              <a:cxn ang="0">
-                <a:pos x="connsiteX1" y="connsiteY1"/>
-              </a:cxn>
-              <a:cxn ang="0">
-                <a:pos x="connsiteX2" y="connsiteY2"/>
-              </a:cxn>
-              <a:cxn ang="0">
-                <a:pos x="connsiteX3" y="connsiteY3"/>
-              </a:cxn>
-              <a:cxn ang="0">
-                <a:pos x="connsiteX4" y="connsiteY4"/>
-              </a:cxn>
-              <a:cxn ang="0">
-                <a:pos x="connsiteX5" y="connsiteY5"/>
-              </a:cxn>
-              <a:cxn ang="0">
-                <a:pos x="connsiteX6" y="connsiteY6"/>
-              </a:cxn>
-              <a:cxn ang="0">
-                <a:pos x="connsiteX7" y="connsiteY7"/>
-              </a:cxn>
-              <a:cxn ang="0">
-                <a:pos x="connsiteX8" y="connsiteY8"/>
-              </a:cxn>
-              <a:cxn ang="0">
-                <a:pos x="connsiteX9" y="connsiteY9"/>
-              </a:cxn>
-              <a:cxn ang="0">
-                <a:pos x="connsiteX10" y="connsiteY10"/>
-              </a:cxn>
-              <a:cxn ang="0">
-                <a:pos x="connsiteX11" y="connsiteY11"/>
-              </a:cxn>
-              <a:cxn ang="0">
-                <a:pos x="connsiteX12" y="connsiteY12"/>
-              </a:cxn>
-              <a:cxn ang="0">
-                <a:pos x="connsiteX13" y="connsiteY13"/>
-              </a:cxn>
-              <a:cxn ang="0">
-                <a:pos x="connsiteX14" y="connsiteY14"/>
-              </a:cxn>
-              <a:cxn ang="0">
-                <a:pos x="connsiteX15" y="connsiteY15"/>
-              </a:cxn>
-              <a:cxn ang="0">
-                <a:pos x="connsiteX16" y="connsiteY16"/>
-              </a:cxn>
-            </a:cxnLst>
-            <a:rect l="l" t="t" r="r" b="b"/>
-            <a:pathLst>
-              <a:path w="151536" h="151536">
-                <a:moveTo>
-                  <a:pt x="141251" y="65483"/>
-                </a:moveTo>
-                <a:lnTo>
-                  <a:pt x="86053" y="65483"/>
-                </a:lnTo>
-                <a:lnTo>
-                  <a:pt x="86053" y="10285"/>
-                </a:lnTo>
-                <a:cubicBezTo>
-                  <a:pt x="86053" y="4605"/>
-                  <a:pt x="81448" y="0"/>
-                  <a:pt x="75768" y="0"/>
-                </a:cubicBezTo>
-                <a:cubicBezTo>
-                  <a:pt x="70088" y="0"/>
-                  <a:pt x="65483" y="4605"/>
-                  <a:pt x="65483" y="10285"/>
-                </a:cubicBezTo>
-                <a:lnTo>
-                  <a:pt x="65483" y="65483"/>
-                </a:lnTo>
-                <a:lnTo>
-                  <a:pt x="10285" y="65483"/>
-                </a:lnTo>
-                <a:cubicBezTo>
-                  <a:pt x="4605" y="65483"/>
-                  <a:pt x="0" y="70088"/>
-                  <a:pt x="0" y="75768"/>
-                </a:cubicBezTo>
-                <a:cubicBezTo>
-                  <a:pt x="0" y="81448"/>
-                  <a:pt x="4605" y="86053"/>
-                  <a:pt x="10285" y="86053"/>
-                </a:cubicBezTo>
-                <a:lnTo>
-                  <a:pt x="65483" y="86053"/>
-                </a:lnTo>
-                <a:lnTo>
-                  <a:pt x="65483" y="141251"/>
-                </a:lnTo>
-                <a:cubicBezTo>
-                  <a:pt x="65483" y="146931"/>
-                  <a:pt x="70088" y="151536"/>
-                  <a:pt x="75768" y="151536"/>
-                </a:cubicBezTo>
-                <a:cubicBezTo>
-                  <a:pt x="81448" y="151536"/>
-                  <a:pt x="86053" y="146931"/>
-                  <a:pt x="86053" y="141251"/>
-                </a:cubicBezTo>
-                <a:lnTo>
-                  <a:pt x="86053" y="86053"/>
-                </a:lnTo>
-                <a:lnTo>
-                  <a:pt x="141251" y="86053"/>
-                </a:lnTo>
-                <a:cubicBezTo>
-                  <a:pt x="146931" y="86053"/>
-                  <a:pt x="151536" y="81448"/>
-                  <a:pt x="151536" y="75768"/>
-                </a:cubicBezTo>
-                <a:cubicBezTo>
-                  <a:pt x="151536" y="70088"/>
-                  <a:pt x="146931" y="65483"/>
-                  <a:pt x="141251" y="65483"/>
-                </a:cubicBezTo>
-                <a:close/>
-              </a:path>
-            </a:pathLst>
-          </a:custGeom>
-          <a:solidFill>
-            <a:schemeClr val="bg1"/>
-          </a:solidFill>
-          <a:ln w="646" cap="flat">
-            <a:noFill/>
-            <a:prstDash val="solid"/>
-            <a:miter/>
-          </a:ln>
-        </p:spPr>
-        <p:txBody>
-          <a:bodyPr rtlCol="0" anchor="ctr"/>
-          <a:lstStyle/>
-          <a:p>
-            <a:endParaRPr lang="en-US"/>
-          </a:p>
-        </p:txBody>
-      </p:sp>
-      <p:sp>
-        <p:nvSpPr>
-          <p:cNvPr id="26" name="Graphic 13">
-            <a:extLst>
-              <a:ext uri="{FF2B5EF4-FFF2-40B4-BE49-F238E27FC236}">
-                <a16:creationId xmlns:a16="http://schemas.microsoft.com/office/drawing/2014/main" id="{C5CB530E-515E-412C-9DF1-5F8FFBD6F383}"/>
-              </a:ext>
-              <a:ext uri="{C183D7F6-B498-43B3-948B-1728B52AA6E4}">
-                <adec:decorative xmlns:adec="http://schemas.microsoft.com/office/drawing/2017/decorative" val="1"/>
-              </a:ext>
-            </a:extLst>
-          </p:cNvPr>
-          <p:cNvSpPr>
-            <a:spLocks noGrp="1" noRot="1" noChangeAspect="1" noMove="1" noResize="1" noEditPoints="1" noAdjustHandles="1" noChangeArrowheads="1" noChangeShapeType="1" noTextEdit="1"/>
-          </p:cNvSpPr>
-          <p:nvPr>
-            <p:extLst>
-              <p:ext uri="{386F3935-93C4-4BCD-93E2-E3B085C9AB24}">
-                <p16:designElem xmlns:p16="http://schemas.microsoft.com/office/powerpoint/2015/main" val="1"/>
-              </p:ext>
-            </p:extLst>
-          </p:nvPr>
-        </p:nvSpPr>
-        <p:spPr>
-          <a:xfrm>
-            <a:off x="10724364" y="2265467"/>
-            <a:ext cx="139039" cy="139039"/>
-          </a:xfrm>
-          <a:custGeom>
-            <a:avLst/>
-            <a:gdLst>
-              <a:gd name="connsiteX0" fmla="*/ 129602 w 139039"/>
-              <a:gd name="connsiteY0" fmla="*/ 60082 h 139039"/>
-              <a:gd name="connsiteX1" fmla="*/ 78957 w 139039"/>
-              <a:gd name="connsiteY1" fmla="*/ 60082 h 139039"/>
-              <a:gd name="connsiteX2" fmla="*/ 78957 w 139039"/>
-              <a:gd name="connsiteY2" fmla="*/ 9437 h 139039"/>
-              <a:gd name="connsiteX3" fmla="*/ 69520 w 139039"/>
-              <a:gd name="connsiteY3" fmla="*/ 0 h 139039"/>
-              <a:gd name="connsiteX4" fmla="*/ 60082 w 139039"/>
-              <a:gd name="connsiteY4" fmla="*/ 9437 h 139039"/>
-              <a:gd name="connsiteX5" fmla="*/ 60082 w 139039"/>
-              <a:gd name="connsiteY5" fmla="*/ 60082 h 139039"/>
-              <a:gd name="connsiteX6" fmla="*/ 9437 w 139039"/>
-              <a:gd name="connsiteY6" fmla="*/ 60082 h 139039"/>
-              <a:gd name="connsiteX7" fmla="*/ 0 w 139039"/>
-              <a:gd name="connsiteY7" fmla="*/ 69520 h 139039"/>
-              <a:gd name="connsiteX8" fmla="*/ 9437 w 139039"/>
-              <a:gd name="connsiteY8" fmla="*/ 78957 h 139039"/>
-              <a:gd name="connsiteX9" fmla="*/ 60082 w 139039"/>
-              <a:gd name="connsiteY9" fmla="*/ 78957 h 139039"/>
-              <a:gd name="connsiteX10" fmla="*/ 60082 w 139039"/>
-              <a:gd name="connsiteY10" fmla="*/ 129602 h 139039"/>
-              <a:gd name="connsiteX11" fmla="*/ 69520 w 139039"/>
-              <a:gd name="connsiteY11" fmla="*/ 139039 h 139039"/>
-              <a:gd name="connsiteX12" fmla="*/ 78957 w 139039"/>
-              <a:gd name="connsiteY12" fmla="*/ 129602 h 139039"/>
-              <a:gd name="connsiteX13" fmla="*/ 78957 w 139039"/>
-              <a:gd name="connsiteY13" fmla="*/ 78957 h 139039"/>
-              <a:gd name="connsiteX14" fmla="*/ 129602 w 139039"/>
-              <a:gd name="connsiteY14" fmla="*/ 78957 h 139039"/>
-              <a:gd name="connsiteX15" fmla="*/ 139039 w 139039"/>
-              <a:gd name="connsiteY15" fmla="*/ 69520 h 139039"/>
-              <a:gd name="connsiteX16" fmla="*/ 129602 w 139039"/>
-              <a:gd name="connsiteY16" fmla="*/ 60082 h 139039"/>
-            </a:gdLst>
-            <a:ahLst/>
-            <a:cxnLst>
-              <a:cxn ang="0">
-                <a:pos x="connsiteX0" y="connsiteY0"/>
-              </a:cxn>
-              <a:cxn ang="0">
-                <a:pos x="connsiteX1" y="connsiteY1"/>
-              </a:cxn>
-              <a:cxn ang="0">
-                <a:pos x="connsiteX2" y="connsiteY2"/>
-              </a:cxn>
-              <a:cxn ang="0">
-                <a:pos x="connsiteX3" y="connsiteY3"/>
-              </a:cxn>
-              <a:cxn ang="0">
-                <a:pos x="connsiteX4" y="connsiteY4"/>
-              </a:cxn>
-              <a:cxn ang="0">
-                <a:pos x="connsiteX5" y="connsiteY5"/>
-              </a:cxn>
-              <a:cxn ang="0">
-                <a:pos x="connsiteX6" y="connsiteY6"/>
-              </a:cxn>
-              <a:cxn ang="0">
-                <a:pos x="connsiteX7" y="connsiteY7"/>
-              </a:cxn>
-              <a:cxn ang="0">
-                <a:pos x="connsiteX8" y="connsiteY8"/>
-              </a:cxn>
-              <a:cxn ang="0">
-                <a:pos x="connsiteX9" y="connsiteY9"/>
-              </a:cxn>
-              <a:cxn ang="0">
-                <a:pos x="connsiteX10" y="connsiteY10"/>
-              </a:cxn>
-              <a:cxn ang="0">
-                <a:pos x="connsiteX11" y="connsiteY11"/>
-              </a:cxn>
-              <a:cxn ang="0">
-                <a:pos x="connsiteX12" y="connsiteY12"/>
-              </a:cxn>
-              <a:cxn ang="0">
-                <a:pos x="connsiteX13" y="connsiteY13"/>
-              </a:cxn>
-              <a:cxn ang="0">
-                <a:pos x="connsiteX14" y="connsiteY14"/>
-              </a:cxn>
-              <a:cxn ang="0">
-                <a:pos x="connsiteX15" y="connsiteY15"/>
-              </a:cxn>
-              <a:cxn ang="0">
-                <a:pos x="connsiteX16" y="connsiteY16"/>
-              </a:cxn>
-            </a:cxnLst>
-            <a:rect l="l" t="t" r="r" b="b"/>
-            <a:pathLst>
-              <a:path w="139039" h="139039">
-                <a:moveTo>
-                  <a:pt x="129602" y="60082"/>
-                </a:moveTo>
-                <a:lnTo>
-                  <a:pt x="78957" y="60082"/>
-                </a:lnTo>
-                <a:lnTo>
-                  <a:pt x="78957" y="9437"/>
-                </a:lnTo>
-                <a:cubicBezTo>
-                  <a:pt x="78957" y="4225"/>
-                  <a:pt x="74731" y="0"/>
-                  <a:pt x="69520" y="0"/>
-                </a:cubicBezTo>
-                <a:cubicBezTo>
-                  <a:pt x="64308" y="0"/>
-                  <a:pt x="60082" y="4225"/>
-                  <a:pt x="60082" y="9437"/>
-                </a:cubicBezTo>
-                <a:lnTo>
-                  <a:pt x="60082" y="60082"/>
-                </a:lnTo>
-                <a:lnTo>
-                  <a:pt x="9437" y="60082"/>
-                </a:lnTo>
-                <a:cubicBezTo>
-                  <a:pt x="4225" y="60082"/>
-                  <a:pt x="0" y="64308"/>
-                  <a:pt x="0" y="69520"/>
-                </a:cubicBezTo>
-                <a:cubicBezTo>
-                  <a:pt x="0" y="74731"/>
-                  <a:pt x="4225" y="78957"/>
-                  <a:pt x="9437" y="78957"/>
-                </a:cubicBezTo>
-                <a:lnTo>
-                  <a:pt x="60082" y="78957"/>
-                </a:lnTo>
-                <a:lnTo>
-                  <a:pt x="60082" y="129602"/>
-                </a:lnTo>
-                <a:cubicBezTo>
-                  <a:pt x="60082" y="134814"/>
-                  <a:pt x="64308" y="139039"/>
-                  <a:pt x="69520" y="139039"/>
-                </a:cubicBezTo>
-                <a:cubicBezTo>
-                  <a:pt x="74731" y="139039"/>
-                  <a:pt x="78957" y="134814"/>
-                  <a:pt x="78957" y="129602"/>
-                </a:cubicBezTo>
-                <a:lnTo>
-                  <a:pt x="78957" y="78957"/>
-                </a:lnTo>
-                <a:lnTo>
-                  <a:pt x="129602" y="78957"/>
-                </a:lnTo>
-                <a:cubicBezTo>
-                  <a:pt x="134814" y="78957"/>
-                  <a:pt x="139039" y="74731"/>
-                  <a:pt x="139039" y="69520"/>
-                </a:cubicBezTo>
-                <a:cubicBezTo>
-                  <a:pt x="139039" y="64308"/>
-                  <a:pt x="134814" y="60082"/>
-                  <a:pt x="129602" y="60082"/>
-                </a:cubicBezTo>
-                <a:close/>
-              </a:path>
-            </a:pathLst>
-          </a:custGeom>
-          <a:solidFill>
-            <a:schemeClr val="bg1"/>
-          </a:solidFill>
-          <a:ln w="603" cap="flat">
-            <a:noFill/>
-            <a:prstDash val="solid"/>
-            <a:miter/>
-          </a:ln>
-        </p:spPr>
-        <p:txBody>
-          <a:bodyPr rtlCol="0" anchor="ctr"/>
-          <a:lstStyle/>
-          <a:p>
-            <a:endParaRPr lang="en-US"/>
-          </a:p>
-        </p:txBody>
-      </p:sp>
-      <p:sp>
-        <p:nvSpPr>
-          <p:cNvPr id="27" name="Graphic 15">
-            <a:extLst>
-              <a:ext uri="{FF2B5EF4-FFF2-40B4-BE49-F238E27FC236}">
-                <a16:creationId xmlns:a16="http://schemas.microsoft.com/office/drawing/2014/main" id="{AEA7509D-F04F-40CB-A0B3-EEF16499CC9F}"/>
-              </a:ext>
-              <a:ext uri="{C183D7F6-B498-43B3-948B-1728B52AA6E4}">
-                <adec:decorative xmlns:adec="http://schemas.microsoft.com/office/drawing/2017/decorative" val="1"/>
-              </a:ext>
-            </a:extLst>
-          </p:cNvPr>
-          <p:cNvSpPr>
-            <a:spLocks noGrp="1" noRot="1" noChangeAspect="1" noMove="1" noResize="1" noEditPoints="1" noAdjustHandles="1" noChangeArrowheads="1" noChangeShapeType="1" noTextEdit="1"/>
-          </p:cNvSpPr>
-          <p:nvPr>
-            <p:extLst>
-              <p:ext uri="{386F3935-93C4-4BCD-93E2-E3B085C9AB24}">
-                <p16:designElem xmlns:p16="http://schemas.microsoft.com/office/powerpoint/2015/main" val="1"/>
-              </p:ext>
-            </p:extLst>
-          </p:nvPr>
-        </p:nvSpPr>
-        <p:spPr>
-          <a:xfrm>
-            <a:off x="11024834" y="2537201"/>
-            <a:ext cx="127714" cy="127714"/>
-          </a:xfrm>
-          <a:custGeom>
-            <a:avLst/>
-            <a:gdLst>
-              <a:gd name="connsiteX0" fmla="*/ 63857 w 127714"/>
-              <a:gd name="connsiteY0" fmla="*/ 18874 h 127714"/>
-              <a:gd name="connsiteX1" fmla="*/ 108840 w 127714"/>
-              <a:gd name="connsiteY1" fmla="*/ 63857 h 127714"/>
-              <a:gd name="connsiteX2" fmla="*/ 63857 w 127714"/>
-              <a:gd name="connsiteY2" fmla="*/ 108840 h 127714"/>
-              <a:gd name="connsiteX3" fmla="*/ 18874 w 127714"/>
-              <a:gd name="connsiteY3" fmla="*/ 63857 h 127714"/>
-              <a:gd name="connsiteX4" fmla="*/ 63857 w 127714"/>
-              <a:gd name="connsiteY4" fmla="*/ 18874 h 127714"/>
-              <a:gd name="connsiteX5" fmla="*/ 63857 w 127714"/>
-              <a:gd name="connsiteY5" fmla="*/ 0 h 127714"/>
-              <a:gd name="connsiteX6" fmla="*/ 0 w 127714"/>
-              <a:gd name="connsiteY6" fmla="*/ 63857 h 127714"/>
-              <a:gd name="connsiteX7" fmla="*/ 63857 w 127714"/>
-              <a:gd name="connsiteY7" fmla="*/ 127714 h 127714"/>
-              <a:gd name="connsiteX8" fmla="*/ 127714 w 127714"/>
-              <a:gd name="connsiteY8" fmla="*/ 63857 h 127714"/>
-              <a:gd name="connsiteX9" fmla="*/ 63857 w 127714"/>
-              <a:gd name="connsiteY9" fmla="*/ 0 h 127714"/>
-            </a:gdLst>
-            <a:ahLst/>
-            <a:cxnLst>
-              <a:cxn ang="0">
-                <a:pos x="connsiteX0" y="connsiteY0"/>
-              </a:cxn>
-              <a:cxn ang="0">
-                <a:pos x="connsiteX1" y="connsiteY1"/>
-              </a:cxn>
-              <a:cxn ang="0">
-                <a:pos x="connsiteX2" y="connsiteY2"/>
-              </a:cxn>
-              <a:cxn ang="0">
-                <a:pos x="connsiteX3" y="connsiteY3"/>
-              </a:cxn>
-              <a:cxn ang="0">
-                <a:pos x="connsiteX4" y="connsiteY4"/>
-              </a:cxn>
-              <a:cxn ang="0">
-                <a:pos x="connsiteX5" y="connsiteY5"/>
-              </a:cxn>
-              <a:cxn ang="0">
-                <a:pos x="connsiteX6" y="connsiteY6"/>
-              </a:cxn>
-              <a:cxn ang="0">
-                <a:pos x="connsiteX7" y="connsiteY7"/>
-              </a:cxn>
-              <a:cxn ang="0">
-                <a:pos x="connsiteX8" y="connsiteY8"/>
-              </a:cxn>
-              <a:cxn ang="0">
-                <a:pos x="connsiteX9" y="connsiteY9"/>
-              </a:cxn>
-            </a:cxnLst>
-            <a:rect l="l" t="t" r="r" b="b"/>
-            <a:pathLst>
-              <a:path w="127714" h="127714">
-                <a:moveTo>
-                  <a:pt x="63857" y="18874"/>
-                </a:moveTo>
-                <a:cubicBezTo>
-                  <a:pt x="88700" y="18874"/>
-                  <a:pt x="108840" y="39014"/>
-                  <a:pt x="108840" y="63857"/>
-                </a:cubicBezTo>
-                <a:cubicBezTo>
-                  <a:pt x="108840" y="88700"/>
-                  <a:pt x="88700" y="108840"/>
-                  <a:pt x="63857" y="108840"/>
-                </a:cubicBezTo>
-                <a:cubicBezTo>
-                  <a:pt x="39014" y="108840"/>
-                  <a:pt x="18874" y="88700"/>
-                  <a:pt x="18874" y="63857"/>
-                </a:cubicBezTo>
-                <a:cubicBezTo>
-                  <a:pt x="18898" y="39024"/>
-                  <a:pt x="39024" y="18898"/>
-                  <a:pt x="63857" y="18874"/>
-                </a:cubicBezTo>
-                <a:moveTo>
-                  <a:pt x="63857" y="0"/>
-                </a:moveTo>
-                <a:cubicBezTo>
-                  <a:pt x="28590" y="0"/>
-                  <a:pt x="0" y="28590"/>
-                  <a:pt x="0" y="63857"/>
-                </a:cubicBezTo>
-                <a:cubicBezTo>
-                  <a:pt x="0" y="99124"/>
-                  <a:pt x="28590" y="127714"/>
-                  <a:pt x="63857" y="127714"/>
-                </a:cubicBezTo>
-                <a:cubicBezTo>
-                  <a:pt x="99124" y="127714"/>
-                  <a:pt x="127714" y="99124"/>
-                  <a:pt x="127714" y="63857"/>
-                </a:cubicBezTo>
-                <a:cubicBezTo>
-                  <a:pt x="127714" y="28590"/>
-                  <a:pt x="99124" y="0"/>
-                  <a:pt x="63857" y="0"/>
-                </a:cubicBezTo>
-                <a:close/>
-              </a:path>
-            </a:pathLst>
-          </a:custGeom>
-          <a:solidFill>
-            <a:schemeClr val="bg1"/>
-          </a:solidFill>
-          <a:ln w="610" cap="flat">
-            <a:noFill/>
-            <a:prstDash val="solid"/>
-            <a:miter/>
-          </a:ln>
-        </p:spPr>
-        <p:txBody>
-          <a:bodyPr rtlCol="0" anchor="ctr"/>
-          <a:lstStyle/>
-          <a:p>
-            <a:endParaRPr lang="en-US"/>
-          </a:p>
-        </p:txBody>
-      </p:sp>
-      <p:sp>
-        <p:nvSpPr>
-          <p:cNvPr id="28" name="Graphic 21">
-            <a:extLst>
-              <a:ext uri="{FF2B5EF4-FFF2-40B4-BE49-F238E27FC236}">
-                <a16:creationId xmlns:a16="http://schemas.microsoft.com/office/drawing/2014/main" id="{C39ADB8F-D187-49D7-BDCF-C1B6DC727068}"/>
-              </a:ext>
-              <a:ext uri="{C183D7F6-B498-43B3-948B-1728B52AA6E4}">
-                <adec:decorative xmlns:adec="http://schemas.microsoft.com/office/drawing/2017/decorative" val="1"/>
-              </a:ext>
-            </a:extLst>
-          </p:cNvPr>
-          <p:cNvSpPr>
-            <a:spLocks noGrp="1" noRot="1" noChangeAspect="1" noMove="1" noResize="1" noEditPoints="1" noAdjustHandles="1" noChangeArrowheads="1" noChangeShapeType="1" noTextEdit="1"/>
-          </p:cNvSpPr>
-          <p:nvPr>
-            <p:extLst>
-              <p:ext uri="{386F3935-93C4-4BCD-93E2-E3B085C9AB24}">
-                <p16:designElem xmlns:p16="http://schemas.microsoft.com/office/powerpoint/2015/main" val="1"/>
-              </p:ext>
-            </p:extLst>
-          </p:nvPr>
-        </p:nvSpPr>
-        <p:spPr>
-          <a:xfrm>
-            <a:off x="1064053" y="2832967"/>
-            <a:ext cx="95759" cy="95759"/>
-          </a:xfrm>
-          <a:custGeom>
-            <a:avLst/>
-            <a:gdLst>
-              <a:gd name="connsiteX0" fmla="*/ 95759 w 95759"/>
-              <a:gd name="connsiteY0" fmla="*/ 47880 h 95759"/>
-              <a:gd name="connsiteX1" fmla="*/ 47880 w 95759"/>
-              <a:gd name="connsiteY1" fmla="*/ 95759 h 95759"/>
-              <a:gd name="connsiteX2" fmla="*/ 0 w 95759"/>
-              <a:gd name="connsiteY2" fmla="*/ 47880 h 95759"/>
-              <a:gd name="connsiteX3" fmla="*/ 47880 w 95759"/>
-              <a:gd name="connsiteY3" fmla="*/ 0 h 95759"/>
-              <a:gd name="connsiteX4" fmla="*/ 95759 w 95759"/>
-              <a:gd name="connsiteY4" fmla="*/ 47880 h 95759"/>
-            </a:gdLst>
-            <a:ahLst/>
-            <a:cxnLst>
-              <a:cxn ang="0">
-                <a:pos x="connsiteX0" y="connsiteY0"/>
-              </a:cxn>
-              <a:cxn ang="0">
-                <a:pos x="connsiteX1" y="connsiteY1"/>
-              </a:cxn>
-              <a:cxn ang="0">
-                <a:pos x="connsiteX2" y="connsiteY2"/>
-              </a:cxn>
-              <a:cxn ang="0">
-                <a:pos x="connsiteX3" y="connsiteY3"/>
-              </a:cxn>
-              <a:cxn ang="0">
-                <a:pos x="connsiteX4" y="connsiteY4"/>
-              </a:cxn>
-            </a:cxnLst>
-            <a:rect l="l" t="t" r="r" b="b"/>
-            <a:pathLst>
-              <a:path w="95759" h="95759">
-                <a:moveTo>
-                  <a:pt x="95759" y="47880"/>
-                </a:moveTo>
-                <a:cubicBezTo>
-                  <a:pt x="95759" y="74323"/>
-                  <a:pt x="74323" y="95759"/>
-                  <a:pt x="47880" y="95759"/>
-                </a:cubicBezTo>
-                <a:cubicBezTo>
-                  <a:pt x="21436" y="95759"/>
-                  <a:pt x="0" y="74323"/>
-                  <a:pt x="0" y="47880"/>
-                </a:cubicBezTo>
-                <a:cubicBezTo>
-                  <a:pt x="0" y="21436"/>
-                  <a:pt x="21436" y="0"/>
-                  <a:pt x="47880" y="0"/>
-                </a:cubicBezTo>
-                <a:cubicBezTo>
-                  <a:pt x="74323" y="0"/>
-                  <a:pt x="95759" y="21436"/>
-                  <a:pt x="95759" y="47880"/>
-                </a:cubicBezTo>
-                <a:close/>
-              </a:path>
-            </a:pathLst>
-          </a:custGeom>
-          <a:solidFill>
-            <a:schemeClr val="bg1"/>
-          </a:solidFill>
-          <a:ln w="469" cap="flat">
-            <a:noFill/>
-            <a:prstDash val="solid"/>
-            <a:miter/>
-          </a:ln>
-        </p:spPr>
-        <p:txBody>
-          <a:bodyPr rtlCol="0" anchor="ctr"/>
-          <a:lstStyle/>
-          <a:p>
-            <a:endParaRPr lang="en-US"/>
-          </a:p>
-        </p:txBody>
-      </p:sp>
-      <p:sp>
-        <p:nvSpPr>
-          <p:cNvPr id="20" name="Graphic 12">
-            <a:extLst>
-              <a:ext uri="{FF2B5EF4-FFF2-40B4-BE49-F238E27FC236}">
-                <a16:creationId xmlns:a16="http://schemas.microsoft.com/office/drawing/2014/main" id="{712D4376-A578-4FF1-94FC-245E7A6A489F}"/>
-              </a:ext>
-              <a:ext uri="{C183D7F6-B498-43B3-948B-1728B52AA6E4}">
-                <adec:decorative xmlns:adec="http://schemas.microsoft.com/office/drawing/2017/decorative" val="1"/>
-              </a:ext>
-            </a:extLst>
-          </p:cNvPr>
-          <p:cNvSpPr>
-            <a:spLocks noGrp="1" noRot="1" noChangeAspect="1" noMove="1" noResize="1" noEditPoints="1" noAdjustHandles="1" noChangeArrowheads="1" noChangeShapeType="1" noTextEdit="1"/>
-          </p:cNvSpPr>
-          <p:nvPr>
-            <p:extLst>
-              <p:ext uri="{386F3935-93C4-4BCD-93E2-E3B085C9AB24}">
-                <p16:designElem xmlns:p16="http://schemas.microsoft.com/office/powerpoint/2015/main" val="1"/>
-              </p:ext>
-            </p:extLst>
-          </p:nvPr>
-        </p:nvSpPr>
-        <p:spPr>
-          <a:xfrm>
-            <a:off x="10772266" y="2803988"/>
-            <a:ext cx="91138" cy="91138"/>
-          </a:xfrm>
-          <a:custGeom>
-            <a:avLst/>
-            <a:gdLst>
-              <a:gd name="connsiteX0" fmla="*/ 91138 w 91138"/>
-              <a:gd name="connsiteY0" fmla="*/ 45569 h 91138"/>
-              <a:gd name="connsiteX1" fmla="*/ 45569 w 91138"/>
-              <a:gd name="connsiteY1" fmla="*/ 91138 h 91138"/>
-              <a:gd name="connsiteX2" fmla="*/ 0 w 91138"/>
-              <a:gd name="connsiteY2" fmla="*/ 45569 h 91138"/>
-              <a:gd name="connsiteX3" fmla="*/ 45569 w 91138"/>
-              <a:gd name="connsiteY3" fmla="*/ 0 h 91138"/>
-              <a:gd name="connsiteX4" fmla="*/ 91138 w 91138"/>
-              <a:gd name="connsiteY4" fmla="*/ 45569 h 91138"/>
-            </a:gdLst>
-            <a:ahLst/>
-            <a:cxnLst>
-              <a:cxn ang="0">
-                <a:pos x="connsiteX0" y="connsiteY0"/>
-              </a:cxn>
-              <a:cxn ang="0">
-                <a:pos x="connsiteX1" y="connsiteY1"/>
-              </a:cxn>
-              <a:cxn ang="0">
-                <a:pos x="connsiteX2" y="connsiteY2"/>
-              </a:cxn>
-              <a:cxn ang="0">
-                <a:pos x="connsiteX3" y="connsiteY3"/>
-              </a:cxn>
-              <a:cxn ang="0">
-                <a:pos x="connsiteX4" y="connsiteY4"/>
-              </a:cxn>
-            </a:cxnLst>
-            <a:rect l="l" t="t" r="r" b="b"/>
-            <a:pathLst>
-              <a:path w="91138" h="91138">
-                <a:moveTo>
-                  <a:pt x="91138" y="45569"/>
-                </a:moveTo>
-                <a:cubicBezTo>
-                  <a:pt x="91138" y="70736"/>
-                  <a:pt x="70736" y="91138"/>
-                  <a:pt x="45569" y="91138"/>
-                </a:cubicBezTo>
-                <a:cubicBezTo>
-                  <a:pt x="20402" y="91138"/>
-                  <a:pt x="0" y="70736"/>
-                  <a:pt x="0" y="45569"/>
-                </a:cubicBezTo>
-                <a:cubicBezTo>
-                  <a:pt x="0" y="20402"/>
-                  <a:pt x="20402" y="0"/>
-                  <a:pt x="45569" y="0"/>
-                </a:cubicBezTo>
-                <a:cubicBezTo>
-                  <a:pt x="70736" y="0"/>
-                  <a:pt x="91138" y="20402"/>
-                  <a:pt x="91138" y="45569"/>
-                </a:cubicBezTo>
-                <a:close/>
-              </a:path>
-            </a:pathLst>
-          </a:custGeom>
-          <a:solidFill>
-            <a:schemeClr val="bg1"/>
-          </a:solidFill>
-          <a:ln w="422" cap="flat">
-            <a:noFill/>
-            <a:prstDash val="solid"/>
-            <a:miter/>
-          </a:ln>
-        </p:spPr>
-        <p:txBody>
-          <a:bodyPr rtlCol="0" anchor="ctr"/>
-          <a:lstStyle/>
-          <a:p>
-            <a:endParaRPr lang="en-US"/>
-          </a:p>
-        </p:txBody>
-      </p:sp>
-      <p:sp>
-        <p:nvSpPr>
-          <p:cNvPr id="22" name="Graphic 23">
-            <a:extLst>
-              <a:ext uri="{FF2B5EF4-FFF2-40B4-BE49-F238E27FC236}">
-                <a16:creationId xmlns:a16="http://schemas.microsoft.com/office/drawing/2014/main" id="{3FBAD350-5664-4811-A208-657FB882D350}"/>
-              </a:ext>
-              <a:ext uri="{C183D7F6-B498-43B3-948B-1728B52AA6E4}">
-                <adec:decorative xmlns:adec="http://schemas.microsoft.com/office/drawing/2017/decorative" val="1"/>
-              </a:ext>
-            </a:extLst>
-          </p:cNvPr>
-          <p:cNvSpPr>
-            <a:spLocks noGrp="1" noRot="1" noChangeAspect="1" noMove="1" noResize="1" noEditPoints="1" noAdjustHandles="1" noChangeArrowheads="1" noChangeShapeType="1" noTextEdit="1"/>
-          </p:cNvSpPr>
-          <p:nvPr>
-            <p:extLst>
-              <p:ext uri="{386F3935-93C4-4BCD-93E2-E3B085C9AB24}">
-                <p16:designElem xmlns:p16="http://schemas.microsoft.com/office/powerpoint/2015/main" val="1"/>
-              </p:ext>
-            </p:extLst>
-          </p:nvPr>
-        </p:nvSpPr>
-        <p:spPr>
-          <a:xfrm>
-            <a:off x="1413405" y="3242499"/>
-            <a:ext cx="108625" cy="108625"/>
-          </a:xfrm>
-          <a:custGeom>
-            <a:avLst/>
-            <a:gdLst>
-              <a:gd name="connsiteX0" fmla="*/ 54313 w 108625"/>
-              <a:gd name="connsiteY0" fmla="*/ 16053 h 108625"/>
-              <a:gd name="connsiteX1" fmla="*/ 92572 w 108625"/>
-              <a:gd name="connsiteY1" fmla="*/ 54313 h 108625"/>
-              <a:gd name="connsiteX2" fmla="*/ 54313 w 108625"/>
-              <a:gd name="connsiteY2" fmla="*/ 92572 h 108625"/>
-              <a:gd name="connsiteX3" fmla="*/ 16053 w 108625"/>
-              <a:gd name="connsiteY3" fmla="*/ 54313 h 108625"/>
-              <a:gd name="connsiteX4" fmla="*/ 54313 w 108625"/>
-              <a:gd name="connsiteY4" fmla="*/ 16053 h 108625"/>
-              <a:gd name="connsiteX5" fmla="*/ 54313 w 108625"/>
-              <a:gd name="connsiteY5" fmla="*/ 0 h 108625"/>
-              <a:gd name="connsiteX6" fmla="*/ 0 w 108625"/>
-              <a:gd name="connsiteY6" fmla="*/ 54313 h 108625"/>
-              <a:gd name="connsiteX7" fmla="*/ 54313 w 108625"/>
-              <a:gd name="connsiteY7" fmla="*/ 108625 h 108625"/>
-              <a:gd name="connsiteX8" fmla="*/ 108625 w 108625"/>
-              <a:gd name="connsiteY8" fmla="*/ 54313 h 108625"/>
-              <a:gd name="connsiteX9" fmla="*/ 54313 w 108625"/>
-              <a:gd name="connsiteY9" fmla="*/ 0 h 108625"/>
-            </a:gdLst>
-            <a:ahLst/>
-            <a:cxnLst>
-              <a:cxn ang="0">
-                <a:pos x="connsiteX0" y="connsiteY0"/>
-              </a:cxn>
-              <a:cxn ang="0">
-                <a:pos x="connsiteX1" y="connsiteY1"/>
-              </a:cxn>
-              <a:cxn ang="0">
-                <a:pos x="connsiteX2" y="connsiteY2"/>
-              </a:cxn>
-              <a:cxn ang="0">
-                <a:pos x="connsiteX3" y="connsiteY3"/>
-              </a:cxn>
-              <a:cxn ang="0">
-                <a:pos x="connsiteX4" y="connsiteY4"/>
-              </a:cxn>
-              <a:cxn ang="0">
-                <a:pos x="connsiteX5" y="connsiteY5"/>
-              </a:cxn>
-              <a:cxn ang="0">
-                <a:pos x="connsiteX6" y="connsiteY6"/>
-              </a:cxn>
-              <a:cxn ang="0">
-                <a:pos x="connsiteX7" y="connsiteY7"/>
-              </a:cxn>
-              <a:cxn ang="0">
-                <a:pos x="connsiteX8" y="connsiteY8"/>
-              </a:cxn>
-              <a:cxn ang="0">
-                <a:pos x="connsiteX9" y="connsiteY9"/>
-              </a:cxn>
-            </a:cxnLst>
-            <a:rect l="l" t="t" r="r" b="b"/>
-            <a:pathLst>
-              <a:path w="108625" h="108625">
-                <a:moveTo>
-                  <a:pt x="54313" y="16053"/>
-                </a:moveTo>
-                <a:cubicBezTo>
-                  <a:pt x="75442" y="16053"/>
-                  <a:pt x="92572" y="33182"/>
-                  <a:pt x="92572" y="54313"/>
-                </a:cubicBezTo>
-                <a:cubicBezTo>
-                  <a:pt x="92572" y="75442"/>
-                  <a:pt x="75442" y="92572"/>
-                  <a:pt x="54313" y="92572"/>
-                </a:cubicBezTo>
-                <a:cubicBezTo>
-                  <a:pt x="33182" y="92572"/>
-                  <a:pt x="16053" y="75442"/>
-                  <a:pt x="16053" y="54313"/>
-                </a:cubicBezTo>
-                <a:cubicBezTo>
-                  <a:pt x="16074" y="33191"/>
-                  <a:pt x="33191" y="16074"/>
-                  <a:pt x="54313" y="16053"/>
-                </a:cubicBezTo>
-                <a:moveTo>
-                  <a:pt x="54313" y="0"/>
-                </a:moveTo>
-                <a:cubicBezTo>
-                  <a:pt x="24317" y="0"/>
-                  <a:pt x="0" y="24317"/>
-                  <a:pt x="0" y="54313"/>
-                </a:cubicBezTo>
-                <a:cubicBezTo>
-                  <a:pt x="0" y="84309"/>
-                  <a:pt x="24317" y="108625"/>
-                  <a:pt x="54313" y="108625"/>
-                </a:cubicBezTo>
-                <a:cubicBezTo>
-                  <a:pt x="84309" y="108625"/>
-                  <a:pt x="108625" y="84309"/>
-                  <a:pt x="108625" y="54313"/>
-                </a:cubicBezTo>
-                <a:cubicBezTo>
-                  <a:pt x="108625" y="24317"/>
-                  <a:pt x="84309" y="0"/>
-                  <a:pt x="54313" y="0"/>
-                </a:cubicBezTo>
-                <a:close/>
-              </a:path>
-            </a:pathLst>
-          </a:custGeom>
-          <a:solidFill>
-            <a:schemeClr val="bg1"/>
-          </a:solidFill>
-          <a:ln w="516" cap="flat">
-            <a:noFill/>
-            <a:prstDash val="solid"/>
-            <a:miter/>
-          </a:ln>
-        </p:spPr>
-        <p:txBody>
-          <a:bodyPr rtlCol="0" anchor="ctr"/>
-          <a:lstStyle/>
-          <a:p>
-            <a:endParaRPr lang="en-US"/>
-          </a:p>
-        </p:txBody>
-      </p:sp>
-      <p:cxnSp>
-        <p:nvCxnSpPr>
-          <p:cNvPr id="24" name="Straight Connector 23">
-            <a:extLst>
-              <a:ext uri="{FF2B5EF4-FFF2-40B4-BE49-F238E27FC236}">
-                <a16:creationId xmlns:a16="http://schemas.microsoft.com/office/drawing/2014/main" id="{56020367-4FD5-4596-8E10-C5F095CD8DBF}"/>
-              </a:ext>
-              <a:ext uri="{C183D7F6-B498-43B3-948B-1728B52AA6E4}">
-                <adec:decorative xmlns:adec="http://schemas.microsoft.com/office/drawing/2017/decorative" val="1"/>
-              </a:ext>
-            </a:extLst>
-          </p:cNvPr>
-          <p:cNvCxnSpPr>
-            <a:cxnSpLocks noGrp="1" noRot="1" noChangeAspect="1" noMove="1" noResize="1" noEditPoints="1" noAdjustHandles="1" noChangeArrowheads="1" noChangeShapeType="1"/>
-          </p:cNvCxnSpPr>
-          <p:nvPr>
-            <p:extLst>
-              <p:ext uri="{386F3935-93C4-4BCD-93E2-E3B085C9AB24}">
-                <p16:designElem xmlns:p16="http://schemas.microsoft.com/office/powerpoint/2015/main" val="1"/>
-              </p:ext>
-            </p:extLst>
-          </p:nvPr>
         </p:nvCxnSpPr>
         <p:spPr>
           <a:xfrm>
-            <a:off x="0" y="5831729"/>
-            <a:ext cx="12188952" cy="0"/>
+            <a:off x="11586162" y="3610394"/>
+            <a:ext cx="0" cy="3238728"/>
           </a:xfrm>
           <a:prstGeom prst="line">
             <a:avLst/>
           </a:prstGeom>
           <a:ln w="25400" cap="sq">
-            <a:solidFill>
-              <a:schemeClr val="bg1"/>
-            </a:solidFill>
+            <a:gradFill flip="none" rotWithShape="1">
+              <a:gsLst>
+                <a:gs pos="0">
+                  <a:schemeClr val="accent2"/>
+                </a:gs>
+                <a:gs pos="100000">
+                  <a:schemeClr val="accent4"/>
+                </a:gs>
+              </a:gsLst>
+              <a:lin ang="16200000" scaled="1"/>
+              <a:tileRect/>
+            </a:gradFill>
             <a:bevel/>
           </a:ln>
         </p:spPr>
@@ -9035,6 +8185,71 @@
           </a:fontRef>
         </p:style>
       </p:cxnSp>
+      <p:sp>
+        <p:nvSpPr>
+          <p:cNvPr id="11" name="TextBox 10">
+            <a:extLst>
+              <a:ext uri="{FF2B5EF4-FFF2-40B4-BE49-F238E27FC236}">
+                <a16:creationId xmlns:a16="http://schemas.microsoft.com/office/drawing/2014/main" id="{34281160-0AC0-27E6-DAA1-F4BD92E3B401}"/>
+              </a:ext>
+            </a:extLst>
+          </p:cNvPr>
+          <p:cNvSpPr txBox="1"/>
+          <p:nvPr/>
+        </p:nvSpPr>
+        <p:spPr>
+          <a:xfrm>
+            <a:off x="0" y="132319"/>
+            <a:ext cx="2018370" cy="369332"/>
+          </a:xfrm>
+          <a:prstGeom prst="rect">
+            <a:avLst/>
+          </a:prstGeom>
+          <a:noFill/>
+        </p:spPr>
+        <p:txBody>
+          <a:bodyPr wrap="square" rtlCol="0">
+            <a:spAutoFit/>
+          </a:bodyPr>
+          <a:lstStyle/>
+          <a:p>
+            <a:r>
+              <a:rPr lang="en-US" dirty="0"/>
+              <a:t>Sample Output :</a:t>
+            </a:r>
+          </a:p>
+        </p:txBody>
+      </p:sp>
+      <p:pic>
+        <p:nvPicPr>
+          <p:cNvPr id="13" name="Picture 12" descr="A screenshot of a computer screen&#10;&#10;Description automatically generated">
+            <a:extLst>
+              <a:ext uri="{FF2B5EF4-FFF2-40B4-BE49-F238E27FC236}">
+                <a16:creationId xmlns:a16="http://schemas.microsoft.com/office/drawing/2014/main" id="{10C32CDE-12E0-4D7A-AB3B-3DF234AC09E0}"/>
+              </a:ext>
+            </a:extLst>
+          </p:cNvPr>
+          <p:cNvPicPr>
+            <a:picLocks noChangeAspect="1"/>
+          </p:cNvPicPr>
+          <p:nvPr/>
+        </p:nvPicPr>
+        <p:blipFill>
+          <a:blip r:embed="rId2"/>
+          <a:stretch>
+            <a:fillRect/>
+          </a:stretch>
+        </p:blipFill>
+        <p:spPr>
+          <a:xfrm>
+            <a:off x="111512" y="1003302"/>
+            <a:ext cx="5522213" cy="5073650"/>
+          </a:xfrm>
+          <a:prstGeom prst="rect">
+            <a:avLst/>
+          </a:prstGeom>
+        </p:spPr>
+      </p:pic>
     </p:spTree>
     <p:extLst>
       <p:ext uri="{BB962C8B-B14F-4D97-AF65-F5344CB8AC3E}">

</xml_diff>

<commit_message>
Updated Slides : Added Thankyou slide
</commit_message>
<xml_diff>
--- a/534-Slides.pptx
+++ b/534-Slides.pptx
@@ -9,6 +9,7 @@
     <p:sldId id="257" r:id="rId3"/>
     <p:sldId id="258" r:id="rId4"/>
     <p:sldId id="259" r:id="rId5"/>
+    <p:sldId id="260" r:id="rId6"/>
   </p:sldIdLst>
   <p:sldSz cx="12192000" cy="6858000"/>
   <p:notesSz cx="6858000" cy="9144000"/>
@@ -8263,6 +8264,1220 @@
 </p:sld>
 </file>
 
+<file path=ppt/slides/slide5.xml><?xml version="1.0" encoding="utf-8"?>
+<p:sld xmlns:a="http://schemas.openxmlformats.org/drawingml/2006/main" xmlns:r="http://schemas.openxmlformats.org/officeDocument/2006/relationships" xmlns:p="http://schemas.openxmlformats.org/presentationml/2006/main">
+  <p:cSld>
+    <p:bg>
+      <p:bgPr>
+        <a:solidFill>
+          <a:schemeClr val="bg1"/>
+        </a:solidFill>
+        <a:effectLst/>
+      </p:bgPr>
+    </p:bg>
+    <p:spTree>
+      <p:nvGrpSpPr>
+        <p:cNvPr id="1" name=""/>
+        <p:cNvGrpSpPr/>
+        <p:nvPr/>
+      </p:nvGrpSpPr>
+      <p:grpSpPr>
+        <a:xfrm>
+          <a:off x="0" y="0"/>
+          <a:ext cx="0" cy="0"/>
+          <a:chOff x="0" y="0"/>
+          <a:chExt cx="0" cy="0"/>
+        </a:xfrm>
+      </p:grpSpPr>
+      <p:cxnSp>
+        <p:nvCxnSpPr>
+          <p:cNvPr id="8" name="Straight Connector 7">
+            <a:extLst>
+              <a:ext uri="{FF2B5EF4-FFF2-40B4-BE49-F238E27FC236}">
+                <a16:creationId xmlns:a16="http://schemas.microsoft.com/office/drawing/2014/main" id="{D1B787A8-0D67-4B7E-9B48-86BD906AB6B5}"/>
+              </a:ext>
+              <a:ext uri="{C183D7F6-B498-43B3-948B-1728B52AA6E4}">
+                <adec:decorative xmlns:adec="http://schemas.microsoft.com/office/drawing/2017/decorative" val="1"/>
+              </a:ext>
+            </a:extLst>
+          </p:cNvPr>
+          <p:cNvCxnSpPr>
+            <a:cxnSpLocks noGrp="1" noRot="1" noChangeAspect="1" noMove="1" noResize="1" noEditPoints="1" noAdjustHandles="1" noChangeArrowheads="1" noChangeShapeType="1"/>
+          </p:cNvCxnSpPr>
+          <p:nvPr>
+            <p:extLst>
+              <p:ext uri="{386F3935-93C4-4BCD-93E2-E3B085C9AB24}">
+                <p16:designElem xmlns:p16="http://schemas.microsoft.com/office/powerpoint/2015/main" val="1"/>
+              </p:ext>
+            </p:extLst>
+          </p:nvPr>
+        </p:nvCxnSpPr>
+        <p:spPr>
+          <a:xfrm>
+            <a:off x="715890" y="1114050"/>
+            <a:ext cx="0" cy="5735637"/>
+          </a:xfrm>
+          <a:prstGeom prst="line">
+            <a:avLst/>
+          </a:prstGeom>
+          <a:ln w="25400" cap="sq">
+            <a:gradFill flip="none" rotWithShape="1">
+              <a:gsLst>
+                <a:gs pos="0">
+                  <a:schemeClr val="accent2"/>
+                </a:gs>
+                <a:gs pos="100000">
+                  <a:schemeClr val="accent4"/>
+                </a:gs>
+              </a:gsLst>
+              <a:lin ang="16200000" scaled="1"/>
+              <a:tileRect/>
+            </a:gradFill>
+            <a:bevel/>
+          </a:ln>
+        </p:spPr>
+        <p:style>
+          <a:lnRef idx="1">
+            <a:schemeClr val="accent1"/>
+          </a:lnRef>
+          <a:fillRef idx="0">
+            <a:schemeClr val="accent1"/>
+          </a:fillRef>
+          <a:effectRef idx="0">
+            <a:schemeClr val="accent1"/>
+          </a:effectRef>
+          <a:fontRef idx="minor">
+            <a:schemeClr val="tx1"/>
+          </a:fontRef>
+        </p:style>
+      </p:cxnSp>
+      <p:sp>
+        <p:nvSpPr>
+          <p:cNvPr id="10" name="Rectangle 9">
+            <a:extLst>
+              <a:ext uri="{FF2B5EF4-FFF2-40B4-BE49-F238E27FC236}">
+                <a16:creationId xmlns:a16="http://schemas.microsoft.com/office/drawing/2014/main" id="{8F9CBE3F-79A8-4F8F-88D9-DAD03D0D281F}"/>
+              </a:ext>
+              <a:ext uri="{C183D7F6-B498-43B3-948B-1728B52AA6E4}">
+                <adec:decorative xmlns:adec="http://schemas.microsoft.com/office/drawing/2017/decorative" val="1"/>
+              </a:ext>
+            </a:extLst>
+          </p:cNvPr>
+          <p:cNvSpPr>
+            <a:spLocks noGrp="1" noRot="1" noChangeAspect="1" noMove="1" noResize="1" noEditPoints="1" noAdjustHandles="1" noChangeArrowheads="1" noChangeShapeType="1" noTextEdit="1"/>
+          </p:cNvSpPr>
+          <p:nvPr>
+            <p:extLst>
+              <p:ext uri="{386F3935-93C4-4BCD-93E2-E3B085C9AB24}">
+                <p16:designElem xmlns:p16="http://schemas.microsoft.com/office/powerpoint/2015/main" val="1"/>
+              </p:ext>
+            </p:extLst>
+          </p:nvPr>
+        </p:nvSpPr>
+        <p:spPr>
+          <a:xfrm>
+            <a:off x="0" y="0"/>
+            <a:ext cx="12192000" cy="6858000"/>
+          </a:xfrm>
+          <a:prstGeom prst="rect">
+            <a:avLst/>
+          </a:prstGeom>
+          <a:gradFill flip="none" rotWithShape="1">
+            <a:gsLst>
+              <a:gs pos="100000">
+                <a:schemeClr val="accent4"/>
+              </a:gs>
+              <a:gs pos="0">
+                <a:schemeClr val="accent2"/>
+              </a:gs>
+            </a:gsLst>
+            <a:lin ang="2700000" scaled="1"/>
+            <a:tileRect/>
+          </a:gradFill>
+          <a:ln>
+            <a:noFill/>
+          </a:ln>
+        </p:spPr>
+        <p:style>
+          <a:lnRef idx="2">
+            <a:schemeClr val="accent1">
+              <a:shade val="50000"/>
+            </a:schemeClr>
+          </a:lnRef>
+          <a:fillRef idx="1">
+            <a:schemeClr val="accent1"/>
+          </a:fillRef>
+          <a:effectRef idx="0">
+            <a:schemeClr val="accent1"/>
+          </a:effectRef>
+          <a:fontRef idx="minor">
+            <a:schemeClr val="lt1"/>
+          </a:fontRef>
+        </p:style>
+        <p:txBody>
+          <a:bodyPr rtlCol="0" anchor="ctr"/>
+          <a:lstStyle/>
+          <a:p>
+            <a:pPr algn="ctr"/>
+            <a:endParaRPr lang="en-US"/>
+          </a:p>
+        </p:txBody>
+      </p:sp>
+      <p:sp>
+        <p:nvSpPr>
+          <p:cNvPr id="2" name="Title 1">
+            <a:extLst>
+              <a:ext uri="{FF2B5EF4-FFF2-40B4-BE49-F238E27FC236}">
+                <a16:creationId xmlns:a16="http://schemas.microsoft.com/office/drawing/2014/main" id="{71F9ADFF-1F4B-1AAB-EFFE-1992141DF1B3}"/>
+              </a:ext>
+            </a:extLst>
+          </p:cNvPr>
+          <p:cNvSpPr>
+            <a:spLocks noGrp="1"/>
+          </p:cNvSpPr>
+          <p:nvPr>
+            <p:ph type="title"/>
+          </p:nvPr>
+        </p:nvSpPr>
+        <p:spPr>
+          <a:xfrm>
+            <a:off x="1522030" y="1209220"/>
+            <a:ext cx="9147940" cy="2337238"/>
+          </a:xfrm>
+        </p:spPr>
+        <p:txBody>
+          <a:bodyPr vert="horz" lIns="91440" tIns="45720" rIns="91440" bIns="45720" rtlCol="0" anchor="b">
+            <a:normAutofit/>
+          </a:bodyPr>
+          <a:lstStyle/>
+          <a:p>
+            <a:pPr algn="ctr"/>
+            <a:r>
+              <a:rPr lang="en-US" sz="6000" b="1" i="0" kern="1200" cap="all" baseline="0" dirty="0">
+                <a:solidFill>
+                  <a:schemeClr val="bg1"/>
+                </a:solidFill>
+                <a:latin typeface="+mj-lt"/>
+                <a:ea typeface="+mj-ea"/>
+                <a:cs typeface="+mj-cs"/>
+              </a:rPr>
+              <a:t>Thank you</a:t>
+            </a:r>
+          </a:p>
+        </p:txBody>
+      </p:sp>
+      <p:sp>
+        <p:nvSpPr>
+          <p:cNvPr id="12" name="Graphic 22">
+            <a:extLst>
+              <a:ext uri="{FF2B5EF4-FFF2-40B4-BE49-F238E27FC236}">
+                <a16:creationId xmlns:a16="http://schemas.microsoft.com/office/drawing/2014/main" id="{508BEF50-7B1E-49A4-BC19-5F4F1D755E64}"/>
+              </a:ext>
+              <a:ext uri="{C183D7F6-B498-43B3-948B-1728B52AA6E4}">
+                <adec:decorative xmlns:adec="http://schemas.microsoft.com/office/drawing/2017/decorative" val="1"/>
+              </a:ext>
+            </a:extLst>
+          </p:cNvPr>
+          <p:cNvSpPr>
+            <a:spLocks noGrp="1" noRot="1" noChangeAspect="1" noMove="1" noResize="1" noEditPoints="1" noAdjustHandles="1" noChangeArrowheads="1" noChangeShapeType="1" noTextEdit="1"/>
+          </p:cNvSpPr>
+          <p:nvPr>
+            <p:extLst>
+              <p:ext uri="{386F3935-93C4-4BCD-93E2-E3B085C9AB24}">
+                <p16:designElem xmlns:p16="http://schemas.microsoft.com/office/powerpoint/2015/main" val="1"/>
+              </p:ext>
+            </p:extLst>
+          </p:nvPr>
+        </p:nvSpPr>
+        <p:spPr>
+          <a:xfrm>
+            <a:off x="1261869" y="2383077"/>
+            <a:ext cx="151536" cy="151536"/>
+          </a:xfrm>
+          <a:custGeom>
+            <a:avLst/>
+            <a:gdLst>
+              <a:gd name="connsiteX0" fmla="*/ 141251 w 151536"/>
+              <a:gd name="connsiteY0" fmla="*/ 65483 h 151536"/>
+              <a:gd name="connsiteX1" fmla="*/ 86053 w 151536"/>
+              <a:gd name="connsiteY1" fmla="*/ 65483 h 151536"/>
+              <a:gd name="connsiteX2" fmla="*/ 86053 w 151536"/>
+              <a:gd name="connsiteY2" fmla="*/ 10285 h 151536"/>
+              <a:gd name="connsiteX3" fmla="*/ 75768 w 151536"/>
+              <a:gd name="connsiteY3" fmla="*/ 0 h 151536"/>
+              <a:gd name="connsiteX4" fmla="*/ 65483 w 151536"/>
+              <a:gd name="connsiteY4" fmla="*/ 10285 h 151536"/>
+              <a:gd name="connsiteX5" fmla="*/ 65483 w 151536"/>
+              <a:gd name="connsiteY5" fmla="*/ 65483 h 151536"/>
+              <a:gd name="connsiteX6" fmla="*/ 10285 w 151536"/>
+              <a:gd name="connsiteY6" fmla="*/ 65483 h 151536"/>
+              <a:gd name="connsiteX7" fmla="*/ 0 w 151536"/>
+              <a:gd name="connsiteY7" fmla="*/ 75768 h 151536"/>
+              <a:gd name="connsiteX8" fmla="*/ 10285 w 151536"/>
+              <a:gd name="connsiteY8" fmla="*/ 86053 h 151536"/>
+              <a:gd name="connsiteX9" fmla="*/ 65483 w 151536"/>
+              <a:gd name="connsiteY9" fmla="*/ 86053 h 151536"/>
+              <a:gd name="connsiteX10" fmla="*/ 65483 w 151536"/>
+              <a:gd name="connsiteY10" fmla="*/ 141251 h 151536"/>
+              <a:gd name="connsiteX11" fmla="*/ 75768 w 151536"/>
+              <a:gd name="connsiteY11" fmla="*/ 151536 h 151536"/>
+              <a:gd name="connsiteX12" fmla="*/ 86053 w 151536"/>
+              <a:gd name="connsiteY12" fmla="*/ 141251 h 151536"/>
+              <a:gd name="connsiteX13" fmla="*/ 86053 w 151536"/>
+              <a:gd name="connsiteY13" fmla="*/ 86053 h 151536"/>
+              <a:gd name="connsiteX14" fmla="*/ 141251 w 151536"/>
+              <a:gd name="connsiteY14" fmla="*/ 86053 h 151536"/>
+              <a:gd name="connsiteX15" fmla="*/ 151536 w 151536"/>
+              <a:gd name="connsiteY15" fmla="*/ 75768 h 151536"/>
+              <a:gd name="connsiteX16" fmla="*/ 141251 w 151536"/>
+              <a:gd name="connsiteY16" fmla="*/ 65483 h 151536"/>
+            </a:gdLst>
+            <a:ahLst/>
+            <a:cxnLst>
+              <a:cxn ang="0">
+                <a:pos x="connsiteX0" y="connsiteY0"/>
+              </a:cxn>
+              <a:cxn ang="0">
+                <a:pos x="connsiteX1" y="connsiteY1"/>
+              </a:cxn>
+              <a:cxn ang="0">
+                <a:pos x="connsiteX2" y="connsiteY2"/>
+              </a:cxn>
+              <a:cxn ang="0">
+                <a:pos x="connsiteX3" y="connsiteY3"/>
+              </a:cxn>
+              <a:cxn ang="0">
+                <a:pos x="connsiteX4" y="connsiteY4"/>
+              </a:cxn>
+              <a:cxn ang="0">
+                <a:pos x="connsiteX5" y="connsiteY5"/>
+              </a:cxn>
+              <a:cxn ang="0">
+                <a:pos x="connsiteX6" y="connsiteY6"/>
+              </a:cxn>
+              <a:cxn ang="0">
+                <a:pos x="connsiteX7" y="connsiteY7"/>
+              </a:cxn>
+              <a:cxn ang="0">
+                <a:pos x="connsiteX8" y="connsiteY8"/>
+              </a:cxn>
+              <a:cxn ang="0">
+                <a:pos x="connsiteX9" y="connsiteY9"/>
+              </a:cxn>
+              <a:cxn ang="0">
+                <a:pos x="connsiteX10" y="connsiteY10"/>
+              </a:cxn>
+              <a:cxn ang="0">
+                <a:pos x="connsiteX11" y="connsiteY11"/>
+              </a:cxn>
+              <a:cxn ang="0">
+                <a:pos x="connsiteX12" y="connsiteY12"/>
+              </a:cxn>
+              <a:cxn ang="0">
+                <a:pos x="connsiteX13" y="connsiteY13"/>
+              </a:cxn>
+              <a:cxn ang="0">
+                <a:pos x="connsiteX14" y="connsiteY14"/>
+              </a:cxn>
+              <a:cxn ang="0">
+                <a:pos x="connsiteX15" y="connsiteY15"/>
+              </a:cxn>
+              <a:cxn ang="0">
+                <a:pos x="connsiteX16" y="connsiteY16"/>
+              </a:cxn>
+            </a:cxnLst>
+            <a:rect l="l" t="t" r="r" b="b"/>
+            <a:pathLst>
+              <a:path w="151536" h="151536">
+                <a:moveTo>
+                  <a:pt x="141251" y="65483"/>
+                </a:moveTo>
+                <a:lnTo>
+                  <a:pt x="86053" y="65483"/>
+                </a:lnTo>
+                <a:lnTo>
+                  <a:pt x="86053" y="10285"/>
+                </a:lnTo>
+                <a:cubicBezTo>
+                  <a:pt x="86053" y="4605"/>
+                  <a:pt x="81448" y="0"/>
+                  <a:pt x="75768" y="0"/>
+                </a:cubicBezTo>
+                <a:cubicBezTo>
+                  <a:pt x="70088" y="0"/>
+                  <a:pt x="65483" y="4605"/>
+                  <a:pt x="65483" y="10285"/>
+                </a:cubicBezTo>
+                <a:lnTo>
+                  <a:pt x="65483" y="65483"/>
+                </a:lnTo>
+                <a:lnTo>
+                  <a:pt x="10285" y="65483"/>
+                </a:lnTo>
+                <a:cubicBezTo>
+                  <a:pt x="4605" y="65483"/>
+                  <a:pt x="0" y="70088"/>
+                  <a:pt x="0" y="75768"/>
+                </a:cubicBezTo>
+                <a:cubicBezTo>
+                  <a:pt x="0" y="81448"/>
+                  <a:pt x="4605" y="86053"/>
+                  <a:pt x="10285" y="86053"/>
+                </a:cubicBezTo>
+                <a:lnTo>
+                  <a:pt x="65483" y="86053"/>
+                </a:lnTo>
+                <a:lnTo>
+                  <a:pt x="65483" y="141251"/>
+                </a:lnTo>
+                <a:cubicBezTo>
+                  <a:pt x="65483" y="146931"/>
+                  <a:pt x="70088" y="151536"/>
+                  <a:pt x="75768" y="151536"/>
+                </a:cubicBezTo>
+                <a:cubicBezTo>
+                  <a:pt x="81448" y="151536"/>
+                  <a:pt x="86053" y="146931"/>
+                  <a:pt x="86053" y="141251"/>
+                </a:cubicBezTo>
+                <a:lnTo>
+                  <a:pt x="86053" y="86053"/>
+                </a:lnTo>
+                <a:lnTo>
+                  <a:pt x="141251" y="86053"/>
+                </a:lnTo>
+                <a:cubicBezTo>
+                  <a:pt x="146931" y="86053"/>
+                  <a:pt x="151536" y="81448"/>
+                  <a:pt x="151536" y="75768"/>
+                </a:cubicBezTo>
+                <a:cubicBezTo>
+                  <a:pt x="151536" y="70088"/>
+                  <a:pt x="146931" y="65483"/>
+                  <a:pt x="141251" y="65483"/>
+                </a:cubicBezTo>
+                <a:close/>
+              </a:path>
+            </a:pathLst>
+          </a:custGeom>
+          <a:solidFill>
+            <a:schemeClr val="bg1"/>
+          </a:solidFill>
+          <a:ln w="646" cap="flat">
+            <a:noFill/>
+            <a:prstDash val="solid"/>
+            <a:miter/>
+          </a:ln>
+        </p:spPr>
+        <p:txBody>
+          <a:bodyPr rtlCol="0" anchor="ctr"/>
+          <a:lstStyle/>
+          <a:p>
+            <a:endParaRPr lang="en-US"/>
+          </a:p>
+        </p:txBody>
+      </p:sp>
+      <p:sp>
+        <p:nvSpPr>
+          <p:cNvPr id="14" name="Graphic 13">
+            <a:extLst>
+              <a:ext uri="{FF2B5EF4-FFF2-40B4-BE49-F238E27FC236}">
+                <a16:creationId xmlns:a16="http://schemas.microsoft.com/office/drawing/2014/main" id="{C5CB530E-515E-412C-9DF1-5F8FFBD6F383}"/>
+              </a:ext>
+              <a:ext uri="{C183D7F6-B498-43B3-948B-1728B52AA6E4}">
+                <adec:decorative xmlns:adec="http://schemas.microsoft.com/office/drawing/2017/decorative" val="1"/>
+              </a:ext>
+            </a:extLst>
+          </p:cNvPr>
+          <p:cNvSpPr>
+            <a:spLocks noGrp="1" noRot="1" noChangeAspect="1" noMove="1" noResize="1" noEditPoints="1" noAdjustHandles="1" noChangeArrowheads="1" noChangeShapeType="1" noTextEdit="1"/>
+          </p:cNvSpPr>
+          <p:nvPr>
+            <p:extLst>
+              <p:ext uri="{386F3935-93C4-4BCD-93E2-E3B085C9AB24}">
+                <p16:designElem xmlns:p16="http://schemas.microsoft.com/office/powerpoint/2015/main" val="1"/>
+              </p:ext>
+            </p:extLst>
+          </p:nvPr>
+        </p:nvSpPr>
+        <p:spPr>
+          <a:xfrm>
+            <a:off x="10724364" y="2265467"/>
+            <a:ext cx="139039" cy="139039"/>
+          </a:xfrm>
+          <a:custGeom>
+            <a:avLst/>
+            <a:gdLst>
+              <a:gd name="connsiteX0" fmla="*/ 129602 w 139039"/>
+              <a:gd name="connsiteY0" fmla="*/ 60082 h 139039"/>
+              <a:gd name="connsiteX1" fmla="*/ 78957 w 139039"/>
+              <a:gd name="connsiteY1" fmla="*/ 60082 h 139039"/>
+              <a:gd name="connsiteX2" fmla="*/ 78957 w 139039"/>
+              <a:gd name="connsiteY2" fmla="*/ 9437 h 139039"/>
+              <a:gd name="connsiteX3" fmla="*/ 69520 w 139039"/>
+              <a:gd name="connsiteY3" fmla="*/ 0 h 139039"/>
+              <a:gd name="connsiteX4" fmla="*/ 60082 w 139039"/>
+              <a:gd name="connsiteY4" fmla="*/ 9437 h 139039"/>
+              <a:gd name="connsiteX5" fmla="*/ 60082 w 139039"/>
+              <a:gd name="connsiteY5" fmla="*/ 60082 h 139039"/>
+              <a:gd name="connsiteX6" fmla="*/ 9437 w 139039"/>
+              <a:gd name="connsiteY6" fmla="*/ 60082 h 139039"/>
+              <a:gd name="connsiteX7" fmla="*/ 0 w 139039"/>
+              <a:gd name="connsiteY7" fmla="*/ 69520 h 139039"/>
+              <a:gd name="connsiteX8" fmla="*/ 9437 w 139039"/>
+              <a:gd name="connsiteY8" fmla="*/ 78957 h 139039"/>
+              <a:gd name="connsiteX9" fmla="*/ 60082 w 139039"/>
+              <a:gd name="connsiteY9" fmla="*/ 78957 h 139039"/>
+              <a:gd name="connsiteX10" fmla="*/ 60082 w 139039"/>
+              <a:gd name="connsiteY10" fmla="*/ 129602 h 139039"/>
+              <a:gd name="connsiteX11" fmla="*/ 69520 w 139039"/>
+              <a:gd name="connsiteY11" fmla="*/ 139039 h 139039"/>
+              <a:gd name="connsiteX12" fmla="*/ 78957 w 139039"/>
+              <a:gd name="connsiteY12" fmla="*/ 129602 h 139039"/>
+              <a:gd name="connsiteX13" fmla="*/ 78957 w 139039"/>
+              <a:gd name="connsiteY13" fmla="*/ 78957 h 139039"/>
+              <a:gd name="connsiteX14" fmla="*/ 129602 w 139039"/>
+              <a:gd name="connsiteY14" fmla="*/ 78957 h 139039"/>
+              <a:gd name="connsiteX15" fmla="*/ 139039 w 139039"/>
+              <a:gd name="connsiteY15" fmla="*/ 69520 h 139039"/>
+              <a:gd name="connsiteX16" fmla="*/ 129602 w 139039"/>
+              <a:gd name="connsiteY16" fmla="*/ 60082 h 139039"/>
+            </a:gdLst>
+            <a:ahLst/>
+            <a:cxnLst>
+              <a:cxn ang="0">
+                <a:pos x="connsiteX0" y="connsiteY0"/>
+              </a:cxn>
+              <a:cxn ang="0">
+                <a:pos x="connsiteX1" y="connsiteY1"/>
+              </a:cxn>
+              <a:cxn ang="0">
+                <a:pos x="connsiteX2" y="connsiteY2"/>
+              </a:cxn>
+              <a:cxn ang="0">
+                <a:pos x="connsiteX3" y="connsiteY3"/>
+              </a:cxn>
+              <a:cxn ang="0">
+                <a:pos x="connsiteX4" y="connsiteY4"/>
+              </a:cxn>
+              <a:cxn ang="0">
+                <a:pos x="connsiteX5" y="connsiteY5"/>
+              </a:cxn>
+              <a:cxn ang="0">
+                <a:pos x="connsiteX6" y="connsiteY6"/>
+              </a:cxn>
+              <a:cxn ang="0">
+                <a:pos x="connsiteX7" y="connsiteY7"/>
+              </a:cxn>
+              <a:cxn ang="0">
+                <a:pos x="connsiteX8" y="connsiteY8"/>
+              </a:cxn>
+              <a:cxn ang="0">
+                <a:pos x="connsiteX9" y="connsiteY9"/>
+              </a:cxn>
+              <a:cxn ang="0">
+                <a:pos x="connsiteX10" y="connsiteY10"/>
+              </a:cxn>
+              <a:cxn ang="0">
+                <a:pos x="connsiteX11" y="connsiteY11"/>
+              </a:cxn>
+              <a:cxn ang="0">
+                <a:pos x="connsiteX12" y="connsiteY12"/>
+              </a:cxn>
+              <a:cxn ang="0">
+                <a:pos x="connsiteX13" y="connsiteY13"/>
+              </a:cxn>
+              <a:cxn ang="0">
+                <a:pos x="connsiteX14" y="connsiteY14"/>
+              </a:cxn>
+              <a:cxn ang="0">
+                <a:pos x="connsiteX15" y="connsiteY15"/>
+              </a:cxn>
+              <a:cxn ang="0">
+                <a:pos x="connsiteX16" y="connsiteY16"/>
+              </a:cxn>
+            </a:cxnLst>
+            <a:rect l="l" t="t" r="r" b="b"/>
+            <a:pathLst>
+              <a:path w="139039" h="139039">
+                <a:moveTo>
+                  <a:pt x="129602" y="60082"/>
+                </a:moveTo>
+                <a:lnTo>
+                  <a:pt x="78957" y="60082"/>
+                </a:lnTo>
+                <a:lnTo>
+                  <a:pt x="78957" y="9437"/>
+                </a:lnTo>
+                <a:cubicBezTo>
+                  <a:pt x="78957" y="4225"/>
+                  <a:pt x="74731" y="0"/>
+                  <a:pt x="69520" y="0"/>
+                </a:cubicBezTo>
+                <a:cubicBezTo>
+                  <a:pt x="64308" y="0"/>
+                  <a:pt x="60082" y="4225"/>
+                  <a:pt x="60082" y="9437"/>
+                </a:cubicBezTo>
+                <a:lnTo>
+                  <a:pt x="60082" y="60082"/>
+                </a:lnTo>
+                <a:lnTo>
+                  <a:pt x="9437" y="60082"/>
+                </a:lnTo>
+                <a:cubicBezTo>
+                  <a:pt x="4225" y="60082"/>
+                  <a:pt x="0" y="64308"/>
+                  <a:pt x="0" y="69520"/>
+                </a:cubicBezTo>
+                <a:cubicBezTo>
+                  <a:pt x="0" y="74731"/>
+                  <a:pt x="4225" y="78957"/>
+                  <a:pt x="9437" y="78957"/>
+                </a:cubicBezTo>
+                <a:lnTo>
+                  <a:pt x="60082" y="78957"/>
+                </a:lnTo>
+                <a:lnTo>
+                  <a:pt x="60082" y="129602"/>
+                </a:lnTo>
+                <a:cubicBezTo>
+                  <a:pt x="60082" y="134814"/>
+                  <a:pt x="64308" y="139039"/>
+                  <a:pt x="69520" y="139039"/>
+                </a:cubicBezTo>
+                <a:cubicBezTo>
+                  <a:pt x="74731" y="139039"/>
+                  <a:pt x="78957" y="134814"/>
+                  <a:pt x="78957" y="129602"/>
+                </a:cubicBezTo>
+                <a:lnTo>
+                  <a:pt x="78957" y="78957"/>
+                </a:lnTo>
+                <a:lnTo>
+                  <a:pt x="129602" y="78957"/>
+                </a:lnTo>
+                <a:cubicBezTo>
+                  <a:pt x="134814" y="78957"/>
+                  <a:pt x="139039" y="74731"/>
+                  <a:pt x="139039" y="69520"/>
+                </a:cubicBezTo>
+                <a:cubicBezTo>
+                  <a:pt x="139039" y="64308"/>
+                  <a:pt x="134814" y="60082"/>
+                  <a:pt x="129602" y="60082"/>
+                </a:cubicBezTo>
+                <a:close/>
+              </a:path>
+            </a:pathLst>
+          </a:custGeom>
+          <a:solidFill>
+            <a:schemeClr val="bg1"/>
+          </a:solidFill>
+          <a:ln w="603" cap="flat">
+            <a:noFill/>
+            <a:prstDash val="solid"/>
+            <a:miter/>
+          </a:ln>
+        </p:spPr>
+        <p:txBody>
+          <a:bodyPr rtlCol="0" anchor="ctr"/>
+          <a:lstStyle/>
+          <a:p>
+            <a:endParaRPr lang="en-US"/>
+          </a:p>
+        </p:txBody>
+      </p:sp>
+      <p:sp>
+        <p:nvSpPr>
+          <p:cNvPr id="16" name="Graphic 15">
+            <a:extLst>
+              <a:ext uri="{FF2B5EF4-FFF2-40B4-BE49-F238E27FC236}">
+                <a16:creationId xmlns:a16="http://schemas.microsoft.com/office/drawing/2014/main" id="{AEA7509D-F04F-40CB-A0B3-EEF16499CC9F}"/>
+              </a:ext>
+              <a:ext uri="{C183D7F6-B498-43B3-948B-1728B52AA6E4}">
+                <adec:decorative xmlns:adec="http://schemas.microsoft.com/office/drawing/2017/decorative" val="1"/>
+              </a:ext>
+            </a:extLst>
+          </p:cNvPr>
+          <p:cNvSpPr>
+            <a:spLocks noGrp="1" noRot="1" noChangeAspect="1" noMove="1" noResize="1" noEditPoints="1" noAdjustHandles="1" noChangeArrowheads="1" noChangeShapeType="1" noTextEdit="1"/>
+          </p:cNvSpPr>
+          <p:nvPr>
+            <p:extLst>
+              <p:ext uri="{386F3935-93C4-4BCD-93E2-E3B085C9AB24}">
+                <p16:designElem xmlns:p16="http://schemas.microsoft.com/office/powerpoint/2015/main" val="1"/>
+              </p:ext>
+            </p:extLst>
+          </p:nvPr>
+        </p:nvSpPr>
+        <p:spPr>
+          <a:xfrm>
+            <a:off x="11024834" y="2537201"/>
+            <a:ext cx="127714" cy="127714"/>
+          </a:xfrm>
+          <a:custGeom>
+            <a:avLst/>
+            <a:gdLst>
+              <a:gd name="connsiteX0" fmla="*/ 63857 w 127714"/>
+              <a:gd name="connsiteY0" fmla="*/ 18874 h 127714"/>
+              <a:gd name="connsiteX1" fmla="*/ 108840 w 127714"/>
+              <a:gd name="connsiteY1" fmla="*/ 63857 h 127714"/>
+              <a:gd name="connsiteX2" fmla="*/ 63857 w 127714"/>
+              <a:gd name="connsiteY2" fmla="*/ 108840 h 127714"/>
+              <a:gd name="connsiteX3" fmla="*/ 18874 w 127714"/>
+              <a:gd name="connsiteY3" fmla="*/ 63857 h 127714"/>
+              <a:gd name="connsiteX4" fmla="*/ 63857 w 127714"/>
+              <a:gd name="connsiteY4" fmla="*/ 18874 h 127714"/>
+              <a:gd name="connsiteX5" fmla="*/ 63857 w 127714"/>
+              <a:gd name="connsiteY5" fmla="*/ 0 h 127714"/>
+              <a:gd name="connsiteX6" fmla="*/ 0 w 127714"/>
+              <a:gd name="connsiteY6" fmla="*/ 63857 h 127714"/>
+              <a:gd name="connsiteX7" fmla="*/ 63857 w 127714"/>
+              <a:gd name="connsiteY7" fmla="*/ 127714 h 127714"/>
+              <a:gd name="connsiteX8" fmla="*/ 127714 w 127714"/>
+              <a:gd name="connsiteY8" fmla="*/ 63857 h 127714"/>
+              <a:gd name="connsiteX9" fmla="*/ 63857 w 127714"/>
+              <a:gd name="connsiteY9" fmla="*/ 0 h 127714"/>
+            </a:gdLst>
+            <a:ahLst/>
+            <a:cxnLst>
+              <a:cxn ang="0">
+                <a:pos x="connsiteX0" y="connsiteY0"/>
+              </a:cxn>
+              <a:cxn ang="0">
+                <a:pos x="connsiteX1" y="connsiteY1"/>
+              </a:cxn>
+              <a:cxn ang="0">
+                <a:pos x="connsiteX2" y="connsiteY2"/>
+              </a:cxn>
+              <a:cxn ang="0">
+                <a:pos x="connsiteX3" y="connsiteY3"/>
+              </a:cxn>
+              <a:cxn ang="0">
+                <a:pos x="connsiteX4" y="connsiteY4"/>
+              </a:cxn>
+              <a:cxn ang="0">
+                <a:pos x="connsiteX5" y="connsiteY5"/>
+              </a:cxn>
+              <a:cxn ang="0">
+                <a:pos x="connsiteX6" y="connsiteY6"/>
+              </a:cxn>
+              <a:cxn ang="0">
+                <a:pos x="connsiteX7" y="connsiteY7"/>
+              </a:cxn>
+              <a:cxn ang="0">
+                <a:pos x="connsiteX8" y="connsiteY8"/>
+              </a:cxn>
+              <a:cxn ang="0">
+                <a:pos x="connsiteX9" y="connsiteY9"/>
+              </a:cxn>
+            </a:cxnLst>
+            <a:rect l="l" t="t" r="r" b="b"/>
+            <a:pathLst>
+              <a:path w="127714" h="127714">
+                <a:moveTo>
+                  <a:pt x="63857" y="18874"/>
+                </a:moveTo>
+                <a:cubicBezTo>
+                  <a:pt x="88700" y="18874"/>
+                  <a:pt x="108840" y="39014"/>
+                  <a:pt x="108840" y="63857"/>
+                </a:cubicBezTo>
+                <a:cubicBezTo>
+                  <a:pt x="108840" y="88700"/>
+                  <a:pt x="88700" y="108840"/>
+                  <a:pt x="63857" y="108840"/>
+                </a:cubicBezTo>
+                <a:cubicBezTo>
+                  <a:pt x="39014" y="108840"/>
+                  <a:pt x="18874" y="88700"/>
+                  <a:pt x="18874" y="63857"/>
+                </a:cubicBezTo>
+                <a:cubicBezTo>
+                  <a:pt x="18898" y="39024"/>
+                  <a:pt x="39024" y="18898"/>
+                  <a:pt x="63857" y="18874"/>
+                </a:cubicBezTo>
+                <a:moveTo>
+                  <a:pt x="63857" y="0"/>
+                </a:moveTo>
+                <a:cubicBezTo>
+                  <a:pt x="28590" y="0"/>
+                  <a:pt x="0" y="28590"/>
+                  <a:pt x="0" y="63857"/>
+                </a:cubicBezTo>
+                <a:cubicBezTo>
+                  <a:pt x="0" y="99124"/>
+                  <a:pt x="28590" y="127714"/>
+                  <a:pt x="63857" y="127714"/>
+                </a:cubicBezTo>
+                <a:cubicBezTo>
+                  <a:pt x="99124" y="127714"/>
+                  <a:pt x="127714" y="99124"/>
+                  <a:pt x="127714" y="63857"/>
+                </a:cubicBezTo>
+                <a:cubicBezTo>
+                  <a:pt x="127714" y="28590"/>
+                  <a:pt x="99124" y="0"/>
+                  <a:pt x="63857" y="0"/>
+                </a:cubicBezTo>
+                <a:close/>
+              </a:path>
+            </a:pathLst>
+          </a:custGeom>
+          <a:solidFill>
+            <a:schemeClr val="bg1"/>
+          </a:solidFill>
+          <a:ln w="610" cap="flat">
+            <a:noFill/>
+            <a:prstDash val="solid"/>
+            <a:miter/>
+          </a:ln>
+        </p:spPr>
+        <p:txBody>
+          <a:bodyPr rtlCol="0" anchor="ctr"/>
+          <a:lstStyle/>
+          <a:p>
+            <a:endParaRPr lang="en-US"/>
+          </a:p>
+        </p:txBody>
+      </p:sp>
+      <p:sp>
+        <p:nvSpPr>
+          <p:cNvPr id="18" name="Graphic 21">
+            <a:extLst>
+              <a:ext uri="{FF2B5EF4-FFF2-40B4-BE49-F238E27FC236}">
+                <a16:creationId xmlns:a16="http://schemas.microsoft.com/office/drawing/2014/main" id="{C39ADB8F-D187-49D7-BDCF-C1B6DC727068}"/>
+              </a:ext>
+              <a:ext uri="{C183D7F6-B498-43B3-948B-1728B52AA6E4}">
+                <adec:decorative xmlns:adec="http://schemas.microsoft.com/office/drawing/2017/decorative" val="1"/>
+              </a:ext>
+            </a:extLst>
+          </p:cNvPr>
+          <p:cNvSpPr>
+            <a:spLocks noGrp="1" noRot="1" noChangeAspect="1" noMove="1" noResize="1" noEditPoints="1" noAdjustHandles="1" noChangeArrowheads="1" noChangeShapeType="1" noTextEdit="1"/>
+          </p:cNvSpPr>
+          <p:nvPr>
+            <p:extLst>
+              <p:ext uri="{386F3935-93C4-4BCD-93E2-E3B085C9AB24}">
+                <p16:designElem xmlns:p16="http://schemas.microsoft.com/office/powerpoint/2015/main" val="1"/>
+              </p:ext>
+            </p:extLst>
+          </p:nvPr>
+        </p:nvSpPr>
+        <p:spPr>
+          <a:xfrm>
+            <a:off x="1064053" y="2832967"/>
+            <a:ext cx="95759" cy="95759"/>
+          </a:xfrm>
+          <a:custGeom>
+            <a:avLst/>
+            <a:gdLst>
+              <a:gd name="connsiteX0" fmla="*/ 95759 w 95759"/>
+              <a:gd name="connsiteY0" fmla="*/ 47880 h 95759"/>
+              <a:gd name="connsiteX1" fmla="*/ 47880 w 95759"/>
+              <a:gd name="connsiteY1" fmla="*/ 95759 h 95759"/>
+              <a:gd name="connsiteX2" fmla="*/ 0 w 95759"/>
+              <a:gd name="connsiteY2" fmla="*/ 47880 h 95759"/>
+              <a:gd name="connsiteX3" fmla="*/ 47880 w 95759"/>
+              <a:gd name="connsiteY3" fmla="*/ 0 h 95759"/>
+              <a:gd name="connsiteX4" fmla="*/ 95759 w 95759"/>
+              <a:gd name="connsiteY4" fmla="*/ 47880 h 95759"/>
+            </a:gdLst>
+            <a:ahLst/>
+            <a:cxnLst>
+              <a:cxn ang="0">
+                <a:pos x="connsiteX0" y="connsiteY0"/>
+              </a:cxn>
+              <a:cxn ang="0">
+                <a:pos x="connsiteX1" y="connsiteY1"/>
+              </a:cxn>
+              <a:cxn ang="0">
+                <a:pos x="connsiteX2" y="connsiteY2"/>
+              </a:cxn>
+              <a:cxn ang="0">
+                <a:pos x="connsiteX3" y="connsiteY3"/>
+              </a:cxn>
+              <a:cxn ang="0">
+                <a:pos x="connsiteX4" y="connsiteY4"/>
+              </a:cxn>
+            </a:cxnLst>
+            <a:rect l="l" t="t" r="r" b="b"/>
+            <a:pathLst>
+              <a:path w="95759" h="95759">
+                <a:moveTo>
+                  <a:pt x="95759" y="47880"/>
+                </a:moveTo>
+                <a:cubicBezTo>
+                  <a:pt x="95759" y="74323"/>
+                  <a:pt x="74323" y="95759"/>
+                  <a:pt x="47880" y="95759"/>
+                </a:cubicBezTo>
+                <a:cubicBezTo>
+                  <a:pt x="21436" y="95759"/>
+                  <a:pt x="0" y="74323"/>
+                  <a:pt x="0" y="47880"/>
+                </a:cubicBezTo>
+                <a:cubicBezTo>
+                  <a:pt x="0" y="21436"/>
+                  <a:pt x="21436" y="0"/>
+                  <a:pt x="47880" y="0"/>
+                </a:cubicBezTo>
+                <a:cubicBezTo>
+                  <a:pt x="74323" y="0"/>
+                  <a:pt x="95759" y="21436"/>
+                  <a:pt x="95759" y="47880"/>
+                </a:cubicBezTo>
+                <a:close/>
+              </a:path>
+            </a:pathLst>
+          </a:custGeom>
+          <a:solidFill>
+            <a:schemeClr val="bg1"/>
+          </a:solidFill>
+          <a:ln w="469" cap="flat">
+            <a:noFill/>
+            <a:prstDash val="solid"/>
+            <a:miter/>
+          </a:ln>
+        </p:spPr>
+        <p:txBody>
+          <a:bodyPr rtlCol="0" anchor="ctr"/>
+          <a:lstStyle/>
+          <a:p>
+            <a:endParaRPr lang="en-US"/>
+          </a:p>
+        </p:txBody>
+      </p:sp>
+      <p:sp>
+        <p:nvSpPr>
+          <p:cNvPr id="20" name="Graphic 12">
+            <a:extLst>
+              <a:ext uri="{FF2B5EF4-FFF2-40B4-BE49-F238E27FC236}">
+                <a16:creationId xmlns:a16="http://schemas.microsoft.com/office/drawing/2014/main" id="{712D4376-A578-4FF1-94FC-245E7A6A489F}"/>
+              </a:ext>
+              <a:ext uri="{C183D7F6-B498-43B3-948B-1728B52AA6E4}">
+                <adec:decorative xmlns:adec="http://schemas.microsoft.com/office/drawing/2017/decorative" val="1"/>
+              </a:ext>
+            </a:extLst>
+          </p:cNvPr>
+          <p:cNvSpPr>
+            <a:spLocks noGrp="1" noRot="1" noChangeAspect="1" noMove="1" noResize="1" noEditPoints="1" noAdjustHandles="1" noChangeArrowheads="1" noChangeShapeType="1" noTextEdit="1"/>
+          </p:cNvSpPr>
+          <p:nvPr>
+            <p:extLst>
+              <p:ext uri="{386F3935-93C4-4BCD-93E2-E3B085C9AB24}">
+                <p16:designElem xmlns:p16="http://schemas.microsoft.com/office/powerpoint/2015/main" val="1"/>
+              </p:ext>
+            </p:extLst>
+          </p:nvPr>
+        </p:nvSpPr>
+        <p:spPr>
+          <a:xfrm>
+            <a:off x="10772266" y="2803988"/>
+            <a:ext cx="91138" cy="91138"/>
+          </a:xfrm>
+          <a:custGeom>
+            <a:avLst/>
+            <a:gdLst>
+              <a:gd name="connsiteX0" fmla="*/ 91138 w 91138"/>
+              <a:gd name="connsiteY0" fmla="*/ 45569 h 91138"/>
+              <a:gd name="connsiteX1" fmla="*/ 45569 w 91138"/>
+              <a:gd name="connsiteY1" fmla="*/ 91138 h 91138"/>
+              <a:gd name="connsiteX2" fmla="*/ 0 w 91138"/>
+              <a:gd name="connsiteY2" fmla="*/ 45569 h 91138"/>
+              <a:gd name="connsiteX3" fmla="*/ 45569 w 91138"/>
+              <a:gd name="connsiteY3" fmla="*/ 0 h 91138"/>
+              <a:gd name="connsiteX4" fmla="*/ 91138 w 91138"/>
+              <a:gd name="connsiteY4" fmla="*/ 45569 h 91138"/>
+            </a:gdLst>
+            <a:ahLst/>
+            <a:cxnLst>
+              <a:cxn ang="0">
+                <a:pos x="connsiteX0" y="connsiteY0"/>
+              </a:cxn>
+              <a:cxn ang="0">
+                <a:pos x="connsiteX1" y="connsiteY1"/>
+              </a:cxn>
+              <a:cxn ang="0">
+                <a:pos x="connsiteX2" y="connsiteY2"/>
+              </a:cxn>
+              <a:cxn ang="0">
+                <a:pos x="connsiteX3" y="connsiteY3"/>
+              </a:cxn>
+              <a:cxn ang="0">
+                <a:pos x="connsiteX4" y="connsiteY4"/>
+              </a:cxn>
+            </a:cxnLst>
+            <a:rect l="l" t="t" r="r" b="b"/>
+            <a:pathLst>
+              <a:path w="91138" h="91138">
+                <a:moveTo>
+                  <a:pt x="91138" y="45569"/>
+                </a:moveTo>
+                <a:cubicBezTo>
+                  <a:pt x="91138" y="70736"/>
+                  <a:pt x="70736" y="91138"/>
+                  <a:pt x="45569" y="91138"/>
+                </a:cubicBezTo>
+                <a:cubicBezTo>
+                  <a:pt x="20402" y="91138"/>
+                  <a:pt x="0" y="70736"/>
+                  <a:pt x="0" y="45569"/>
+                </a:cubicBezTo>
+                <a:cubicBezTo>
+                  <a:pt x="0" y="20402"/>
+                  <a:pt x="20402" y="0"/>
+                  <a:pt x="45569" y="0"/>
+                </a:cubicBezTo>
+                <a:cubicBezTo>
+                  <a:pt x="70736" y="0"/>
+                  <a:pt x="91138" y="20402"/>
+                  <a:pt x="91138" y="45569"/>
+                </a:cubicBezTo>
+                <a:close/>
+              </a:path>
+            </a:pathLst>
+          </a:custGeom>
+          <a:solidFill>
+            <a:schemeClr val="bg1"/>
+          </a:solidFill>
+          <a:ln w="422" cap="flat">
+            <a:noFill/>
+            <a:prstDash val="solid"/>
+            <a:miter/>
+          </a:ln>
+        </p:spPr>
+        <p:txBody>
+          <a:bodyPr rtlCol="0" anchor="ctr"/>
+          <a:lstStyle/>
+          <a:p>
+            <a:endParaRPr lang="en-US"/>
+          </a:p>
+        </p:txBody>
+      </p:sp>
+      <p:sp>
+        <p:nvSpPr>
+          <p:cNvPr id="22" name="Graphic 23">
+            <a:extLst>
+              <a:ext uri="{FF2B5EF4-FFF2-40B4-BE49-F238E27FC236}">
+                <a16:creationId xmlns:a16="http://schemas.microsoft.com/office/drawing/2014/main" id="{3FBAD350-5664-4811-A208-657FB882D350}"/>
+              </a:ext>
+              <a:ext uri="{C183D7F6-B498-43B3-948B-1728B52AA6E4}">
+                <adec:decorative xmlns:adec="http://schemas.microsoft.com/office/drawing/2017/decorative" val="1"/>
+              </a:ext>
+            </a:extLst>
+          </p:cNvPr>
+          <p:cNvSpPr>
+            <a:spLocks noGrp="1" noRot="1" noChangeAspect="1" noMove="1" noResize="1" noEditPoints="1" noAdjustHandles="1" noChangeArrowheads="1" noChangeShapeType="1" noTextEdit="1"/>
+          </p:cNvSpPr>
+          <p:nvPr>
+            <p:extLst>
+              <p:ext uri="{386F3935-93C4-4BCD-93E2-E3B085C9AB24}">
+                <p16:designElem xmlns:p16="http://schemas.microsoft.com/office/powerpoint/2015/main" val="1"/>
+              </p:ext>
+            </p:extLst>
+          </p:nvPr>
+        </p:nvSpPr>
+        <p:spPr>
+          <a:xfrm>
+            <a:off x="1413405" y="3242499"/>
+            <a:ext cx="108625" cy="108625"/>
+          </a:xfrm>
+          <a:custGeom>
+            <a:avLst/>
+            <a:gdLst>
+              <a:gd name="connsiteX0" fmla="*/ 54313 w 108625"/>
+              <a:gd name="connsiteY0" fmla="*/ 16053 h 108625"/>
+              <a:gd name="connsiteX1" fmla="*/ 92572 w 108625"/>
+              <a:gd name="connsiteY1" fmla="*/ 54313 h 108625"/>
+              <a:gd name="connsiteX2" fmla="*/ 54313 w 108625"/>
+              <a:gd name="connsiteY2" fmla="*/ 92572 h 108625"/>
+              <a:gd name="connsiteX3" fmla="*/ 16053 w 108625"/>
+              <a:gd name="connsiteY3" fmla="*/ 54313 h 108625"/>
+              <a:gd name="connsiteX4" fmla="*/ 54313 w 108625"/>
+              <a:gd name="connsiteY4" fmla="*/ 16053 h 108625"/>
+              <a:gd name="connsiteX5" fmla="*/ 54313 w 108625"/>
+              <a:gd name="connsiteY5" fmla="*/ 0 h 108625"/>
+              <a:gd name="connsiteX6" fmla="*/ 0 w 108625"/>
+              <a:gd name="connsiteY6" fmla="*/ 54313 h 108625"/>
+              <a:gd name="connsiteX7" fmla="*/ 54313 w 108625"/>
+              <a:gd name="connsiteY7" fmla="*/ 108625 h 108625"/>
+              <a:gd name="connsiteX8" fmla="*/ 108625 w 108625"/>
+              <a:gd name="connsiteY8" fmla="*/ 54313 h 108625"/>
+              <a:gd name="connsiteX9" fmla="*/ 54313 w 108625"/>
+              <a:gd name="connsiteY9" fmla="*/ 0 h 108625"/>
+            </a:gdLst>
+            <a:ahLst/>
+            <a:cxnLst>
+              <a:cxn ang="0">
+                <a:pos x="connsiteX0" y="connsiteY0"/>
+              </a:cxn>
+              <a:cxn ang="0">
+                <a:pos x="connsiteX1" y="connsiteY1"/>
+              </a:cxn>
+              <a:cxn ang="0">
+                <a:pos x="connsiteX2" y="connsiteY2"/>
+              </a:cxn>
+              <a:cxn ang="0">
+                <a:pos x="connsiteX3" y="connsiteY3"/>
+              </a:cxn>
+              <a:cxn ang="0">
+                <a:pos x="connsiteX4" y="connsiteY4"/>
+              </a:cxn>
+              <a:cxn ang="0">
+                <a:pos x="connsiteX5" y="connsiteY5"/>
+              </a:cxn>
+              <a:cxn ang="0">
+                <a:pos x="connsiteX6" y="connsiteY6"/>
+              </a:cxn>
+              <a:cxn ang="0">
+                <a:pos x="connsiteX7" y="connsiteY7"/>
+              </a:cxn>
+              <a:cxn ang="0">
+                <a:pos x="connsiteX8" y="connsiteY8"/>
+              </a:cxn>
+              <a:cxn ang="0">
+                <a:pos x="connsiteX9" y="connsiteY9"/>
+              </a:cxn>
+            </a:cxnLst>
+            <a:rect l="l" t="t" r="r" b="b"/>
+            <a:pathLst>
+              <a:path w="108625" h="108625">
+                <a:moveTo>
+                  <a:pt x="54313" y="16053"/>
+                </a:moveTo>
+                <a:cubicBezTo>
+                  <a:pt x="75442" y="16053"/>
+                  <a:pt x="92572" y="33182"/>
+                  <a:pt x="92572" y="54313"/>
+                </a:cubicBezTo>
+                <a:cubicBezTo>
+                  <a:pt x="92572" y="75442"/>
+                  <a:pt x="75442" y="92572"/>
+                  <a:pt x="54313" y="92572"/>
+                </a:cubicBezTo>
+                <a:cubicBezTo>
+                  <a:pt x="33182" y="92572"/>
+                  <a:pt x="16053" y="75442"/>
+                  <a:pt x="16053" y="54313"/>
+                </a:cubicBezTo>
+                <a:cubicBezTo>
+                  <a:pt x="16074" y="33191"/>
+                  <a:pt x="33191" y="16074"/>
+                  <a:pt x="54313" y="16053"/>
+                </a:cubicBezTo>
+                <a:moveTo>
+                  <a:pt x="54313" y="0"/>
+                </a:moveTo>
+                <a:cubicBezTo>
+                  <a:pt x="24317" y="0"/>
+                  <a:pt x="0" y="24317"/>
+                  <a:pt x="0" y="54313"/>
+                </a:cubicBezTo>
+                <a:cubicBezTo>
+                  <a:pt x="0" y="84309"/>
+                  <a:pt x="24317" y="108625"/>
+                  <a:pt x="54313" y="108625"/>
+                </a:cubicBezTo>
+                <a:cubicBezTo>
+                  <a:pt x="84309" y="108625"/>
+                  <a:pt x="108625" y="84309"/>
+                  <a:pt x="108625" y="54313"/>
+                </a:cubicBezTo>
+                <a:cubicBezTo>
+                  <a:pt x="108625" y="24317"/>
+                  <a:pt x="84309" y="0"/>
+                  <a:pt x="54313" y="0"/>
+                </a:cubicBezTo>
+                <a:close/>
+              </a:path>
+            </a:pathLst>
+          </a:custGeom>
+          <a:solidFill>
+            <a:schemeClr val="bg1"/>
+          </a:solidFill>
+          <a:ln w="516" cap="flat">
+            <a:noFill/>
+            <a:prstDash val="solid"/>
+            <a:miter/>
+          </a:ln>
+        </p:spPr>
+        <p:txBody>
+          <a:bodyPr rtlCol="0" anchor="ctr"/>
+          <a:lstStyle/>
+          <a:p>
+            <a:endParaRPr lang="en-US"/>
+          </a:p>
+        </p:txBody>
+      </p:sp>
+      <p:cxnSp>
+        <p:nvCxnSpPr>
+          <p:cNvPr id="24" name="Straight Connector 23">
+            <a:extLst>
+              <a:ext uri="{FF2B5EF4-FFF2-40B4-BE49-F238E27FC236}">
+                <a16:creationId xmlns:a16="http://schemas.microsoft.com/office/drawing/2014/main" id="{56020367-4FD5-4596-8E10-C5F095CD8DBF}"/>
+              </a:ext>
+              <a:ext uri="{C183D7F6-B498-43B3-948B-1728B52AA6E4}">
+                <adec:decorative xmlns:adec="http://schemas.microsoft.com/office/drawing/2017/decorative" val="1"/>
+              </a:ext>
+            </a:extLst>
+          </p:cNvPr>
+          <p:cNvCxnSpPr>
+            <a:cxnSpLocks noGrp="1" noRot="1" noChangeAspect="1" noMove="1" noResize="1" noEditPoints="1" noAdjustHandles="1" noChangeArrowheads="1" noChangeShapeType="1"/>
+          </p:cNvCxnSpPr>
+          <p:nvPr>
+            <p:extLst>
+              <p:ext uri="{386F3935-93C4-4BCD-93E2-E3B085C9AB24}">
+                <p16:designElem xmlns:p16="http://schemas.microsoft.com/office/powerpoint/2015/main" val="1"/>
+              </p:ext>
+            </p:extLst>
+          </p:nvPr>
+        </p:nvCxnSpPr>
+        <p:spPr>
+          <a:xfrm>
+            <a:off x="0" y="5831729"/>
+            <a:ext cx="12188952" cy="0"/>
+          </a:xfrm>
+          <a:prstGeom prst="line">
+            <a:avLst/>
+          </a:prstGeom>
+          <a:ln w="25400" cap="sq">
+            <a:solidFill>
+              <a:schemeClr val="bg1"/>
+            </a:solidFill>
+            <a:bevel/>
+          </a:ln>
+        </p:spPr>
+        <p:style>
+          <a:lnRef idx="1">
+            <a:schemeClr val="accent1"/>
+          </a:lnRef>
+          <a:fillRef idx="0">
+            <a:schemeClr val="accent1"/>
+          </a:fillRef>
+          <a:effectRef idx="0">
+            <a:schemeClr val="accent1"/>
+          </a:effectRef>
+          <a:fontRef idx="minor">
+            <a:schemeClr val="tx1"/>
+          </a:fontRef>
+        </p:style>
+      </p:cxnSp>
+    </p:spTree>
+    <p:extLst>
+      <p:ext uri="{BB962C8B-B14F-4D97-AF65-F5344CB8AC3E}">
+        <p14:creationId xmlns:p14="http://schemas.microsoft.com/office/powerpoint/2010/main" val="1889300682"/>
+      </p:ext>
+    </p:extLst>
+  </p:cSld>
+  <p:clrMapOvr>
+    <a:masterClrMapping/>
+  </p:clrMapOvr>
+</p:sld>
+</file>
+
 <file path=ppt/theme/theme1.xml><?xml version="1.0" encoding="utf-8"?>
 <a:theme xmlns:a="http://schemas.openxmlformats.org/drawingml/2006/main" name="GradientVTI">
   <a:themeElements>

</xml_diff>